<commit_message>
updated school slide templates
</commit_message>
<xml_diff>
--- a/Slides/Schools Snapshot/AssessmentOverview_SAPEP_202306.pptx
+++ b/Slides/Schools Snapshot/AssessmentOverview_SAPEP_202306.pptx
@@ -587,8 +587,8 @@
 </file>
 
 <file path=ppt/slideLayouts/slideLayout10.xml><?xml version="1.0" encoding="utf-8"?>
-<p:sldLayout xmlns:a="http://schemas.openxmlformats.org/drawingml/2006/main" xmlns:r="http://schemas.openxmlformats.org/officeDocument/2006/relationships" xmlns:p="http://schemas.openxmlformats.org/presentationml/2006/main" preserve="1">
-  <p:cSld name="Comparison - Yellow Sub-Header">
+<p:sldLayout xmlns:a="http://schemas.openxmlformats.org/drawingml/2006/main" xmlns:r="http://schemas.openxmlformats.org/officeDocument/2006/relationships" xmlns:p="http://schemas.openxmlformats.org/presentationml/2006/main" type="blank" preserve="1">
+  <p:cSld name="Blank">
     <p:spTree>
       <p:nvGrpSpPr>
         <p:cNvPr id="1" name=""/>
@@ -605,10 +605,10 @@
       </p:grpSpPr>
       <p:sp>
         <p:nvSpPr>
-          <p:cNvPr id="3" name="Text Placeholder 2">
-            <a:extLst>
-              <a:ext uri="{FF2B5EF4-FFF2-40B4-BE49-F238E27FC236}">
-                <a16:creationId xmlns:a16="http://schemas.microsoft.com/office/drawing/2014/main" id="{A7EE70C0-0004-DA5B-411C-22A2E3426F32}"/>
+          <p:cNvPr id="6" name="Slide Number Placeholder 5">
+            <a:extLst>
+              <a:ext uri="{FF2B5EF4-FFF2-40B4-BE49-F238E27FC236}">
+                <a16:creationId xmlns:a16="http://schemas.microsoft.com/office/drawing/2014/main" id="{D69C960F-029C-289D-38D6-CF5F60CDEE1C}"/>
               </a:ext>
             </a:extLst>
           </p:cNvPr>
@@ -616,264 +616,44 @@
             <a:spLocks noGrp="1"/>
           </p:cNvSpPr>
           <p:nvPr>
-            <p:ph type="body" idx="1"/>
+            <p:ph type="sldNum" sz="quarter" idx="4"/>
           </p:nvPr>
         </p:nvSpPr>
         <p:spPr>
           <a:xfrm>
-            <a:off x="326590" y="1150069"/>
-            <a:ext cx="5693210" cy="659877"/>
-          </a:xfrm>
-          <a:prstGeom prst="rect">
-            <a:avLst/>
-          </a:prstGeom>
-          <a:solidFill>
-            <a:srgbClr val="F4DB52"/>
-          </a:solidFill>
-        </p:spPr>
-        <p:txBody>
-          <a:bodyPr anchor="b"/>
+            <a:off x="11484634" y="6650966"/>
+            <a:ext cx="370936" cy="207034"/>
+          </a:xfrm>
+          <a:prstGeom prst="rect">
+            <a:avLst/>
+          </a:prstGeom>
+        </p:spPr>
+        <p:txBody>
+          <a:bodyPr/>
           <a:lstStyle>
-            <a:lvl1pPr marL="0" indent="0">
-              <a:buNone/>
-              <a:defRPr sz="2800" b="1">
+            <a:lvl1pPr algn="r">
+              <a:defRPr sz="1000">
                 <a:solidFill>
-                  <a:schemeClr val="tx1"/>
-                </a:solidFill>
-              </a:defRPr>
-            </a:lvl1pPr>
-            <a:lvl2pPr marL="457200" indent="0">
-              <a:buNone/>
-              <a:defRPr sz="2000" b="1"/>
-            </a:lvl2pPr>
-            <a:lvl3pPr marL="914400" indent="0">
-              <a:buNone/>
-              <a:defRPr sz="1800" b="1"/>
-            </a:lvl3pPr>
-            <a:lvl4pPr marL="1371600" indent="0">
-              <a:buNone/>
-              <a:defRPr sz="1600" b="1"/>
-            </a:lvl4pPr>
-            <a:lvl5pPr marL="1828800" indent="0">
-              <a:buNone/>
-              <a:defRPr sz="1600" b="1"/>
-            </a:lvl5pPr>
-            <a:lvl6pPr marL="2286000" indent="0">
-              <a:buNone/>
-              <a:defRPr sz="1600" b="1"/>
-            </a:lvl6pPr>
-            <a:lvl7pPr marL="2743200" indent="0">
-              <a:buNone/>
-              <a:defRPr sz="1600" b="1"/>
-            </a:lvl7pPr>
-            <a:lvl8pPr marL="3200400" indent="0">
-              <a:buNone/>
-              <a:defRPr sz="1600" b="1"/>
-            </a:lvl8pPr>
-            <a:lvl9pPr marL="3657600" indent="0">
-              <a:buNone/>
-              <a:defRPr sz="1600" b="1"/>
-            </a:lvl9pPr>
-          </a:lstStyle>
-          <a:p>
-            <a:pPr lvl="0"/>
-            <a:r>
-              <a:rPr lang="en-US"/>
-              <a:t>Click to edit Master text styles</a:t>
-            </a:r>
-          </a:p>
-        </p:txBody>
-      </p:sp>
-      <p:sp>
-        <p:nvSpPr>
-          <p:cNvPr id="4" name="Content Placeholder 3">
-            <a:extLst>
-              <a:ext uri="{FF2B5EF4-FFF2-40B4-BE49-F238E27FC236}">
-                <a16:creationId xmlns:a16="http://schemas.microsoft.com/office/drawing/2014/main" id="{433E7C9F-2EEC-6475-AE93-1246752B2204}"/>
-              </a:ext>
-            </a:extLst>
-          </p:cNvPr>
-          <p:cNvSpPr>
-            <a:spLocks noGrp="1"/>
-          </p:cNvSpPr>
-          <p:nvPr>
-            <p:ph sz="half" idx="2"/>
-          </p:nvPr>
-        </p:nvSpPr>
-        <p:spPr>
-          <a:xfrm>
-            <a:off x="326590" y="1809946"/>
-            <a:ext cx="5693210" cy="4619134"/>
-          </a:xfrm>
-          <a:prstGeom prst="rect">
-            <a:avLst/>
-          </a:prstGeom>
-        </p:spPr>
-        <p:txBody>
-          <a:bodyPr/>
-          <a:lstStyle/>
-          <a:p>
-            <a:pPr lvl="0"/>
-            <a:r>
-              <a:rPr lang="en-US"/>
-              <a:t>Click to edit Master text styles</a:t>
-            </a:r>
-          </a:p>
-          <a:p>
-            <a:pPr lvl="1"/>
-            <a:r>
-              <a:rPr lang="en-US"/>
-              <a:t>Second level</a:t>
-            </a:r>
-          </a:p>
-          <a:p>
-            <a:pPr lvl="2"/>
-            <a:r>
-              <a:rPr lang="en-US"/>
-              <a:t>Third level</a:t>
-            </a:r>
-          </a:p>
-          <a:p>
-            <a:pPr lvl="3"/>
-            <a:r>
-              <a:rPr lang="en-US"/>
-              <a:t>Fourth level</a:t>
-            </a:r>
-          </a:p>
-          <a:p>
-            <a:pPr lvl="4"/>
-            <a:r>
-              <a:rPr lang="en-US"/>
-              <a:t>Fifth level</a:t>
-            </a:r>
-            <a:endParaRPr lang="en-GB" dirty="0"/>
-          </a:p>
-        </p:txBody>
-      </p:sp>
-      <p:sp>
-        <p:nvSpPr>
-          <p:cNvPr id="5" name="Text Placeholder 4">
-            <a:extLst>
-              <a:ext uri="{FF2B5EF4-FFF2-40B4-BE49-F238E27FC236}">
-                <a16:creationId xmlns:a16="http://schemas.microsoft.com/office/drawing/2014/main" id="{6581B006-631F-4BB6-7AFB-4D358EC005E0}"/>
-              </a:ext>
-            </a:extLst>
-          </p:cNvPr>
-          <p:cNvSpPr>
-            <a:spLocks noGrp="1"/>
-          </p:cNvSpPr>
-          <p:nvPr>
-            <p:ph type="body" sz="quarter" idx="3"/>
-          </p:nvPr>
-        </p:nvSpPr>
-        <p:spPr>
-          <a:xfrm>
-            <a:off x="6172199" y="1150069"/>
-            <a:ext cx="5683371" cy="659877"/>
-          </a:xfrm>
-          <a:prstGeom prst="rect">
-            <a:avLst/>
-          </a:prstGeom>
-          <a:solidFill>
-            <a:srgbClr val="F4DB52"/>
-          </a:solidFill>
-        </p:spPr>
-        <p:txBody>
-          <a:bodyPr vert="horz" lIns="91440" tIns="45720" rIns="91440" bIns="45720" rtlCol="0" anchor="b">
-            <a:normAutofit/>
-          </a:bodyPr>
-          <a:lstStyle>
-            <a:lvl1pPr>
-              <a:defRPr lang="en-US" b="1" dirty="0">
-                <a:solidFill>
-                  <a:schemeClr val="tx1"/>
+                  <a:schemeClr val="bg1"/>
                 </a:solidFill>
               </a:defRPr>
             </a:lvl1pPr>
           </a:lstStyle>
           <a:p>
-            <a:pPr marL="0" lvl="0" indent="0">
-              <a:buNone/>
-            </a:pPr>
-            <a:r>
-              <a:rPr lang="en-US"/>
-              <a:t>Click to edit Master text styles</a:t>
-            </a:r>
-          </a:p>
-        </p:txBody>
-      </p:sp>
-      <p:sp>
-        <p:nvSpPr>
-          <p:cNvPr id="6" name="Content Placeholder 5">
-            <a:extLst>
-              <a:ext uri="{FF2B5EF4-FFF2-40B4-BE49-F238E27FC236}">
-                <a16:creationId xmlns:a16="http://schemas.microsoft.com/office/drawing/2014/main" id="{4D14FAB4-C3D5-5802-AC62-3F1B0FEE0444}"/>
-              </a:ext>
-            </a:extLst>
-          </p:cNvPr>
-          <p:cNvSpPr>
-            <a:spLocks noGrp="1"/>
-          </p:cNvSpPr>
-          <p:nvPr>
-            <p:ph sz="quarter" idx="4"/>
-          </p:nvPr>
-        </p:nvSpPr>
-        <p:spPr>
-          <a:xfrm>
-            <a:off x="6172199" y="1809946"/>
-            <a:ext cx="5673525" cy="4619134"/>
-          </a:xfrm>
-          <a:prstGeom prst="rect">
-            <a:avLst/>
-          </a:prstGeom>
-        </p:spPr>
-        <p:txBody>
-          <a:bodyPr/>
-          <a:lstStyle/>
-          <a:p>
-            <a:pPr lvl="0"/>
-            <a:r>
-              <a:rPr lang="en-US"/>
-              <a:t>Click to edit Master text styles</a:t>
-            </a:r>
-          </a:p>
-          <a:p>
-            <a:pPr lvl="1"/>
-            <a:r>
-              <a:rPr lang="en-US"/>
-              <a:t>Second level</a:t>
-            </a:r>
-          </a:p>
-          <a:p>
-            <a:pPr lvl="2"/>
-            <a:r>
-              <a:rPr lang="en-US"/>
-              <a:t>Third level</a:t>
-            </a:r>
-          </a:p>
-          <a:p>
-            <a:pPr lvl="3"/>
-            <a:r>
-              <a:rPr lang="en-US"/>
-              <a:t>Fourth level</a:t>
-            </a:r>
-          </a:p>
-          <a:p>
-            <a:pPr lvl="4"/>
-            <a:r>
-              <a:rPr lang="en-US"/>
-              <a:t>Fifth level</a:t>
-            </a:r>
+            <a:fld id="{7767393B-85A6-40C1-AB65-A74DA355DB56}" type="slidenum">
+              <a:rPr lang="en-GB" smtClean="0"/>
+              <a:t>‹#›</a:t>
+            </a:fld>
             <a:endParaRPr lang="en-GB"/>
           </a:p>
         </p:txBody>
       </p:sp>
       <p:sp>
         <p:nvSpPr>
-          <p:cNvPr id="11" name="Rectangle 10">
-            <a:extLst>
-              <a:ext uri="{FF2B5EF4-FFF2-40B4-BE49-F238E27FC236}">
-                <a16:creationId xmlns:a16="http://schemas.microsoft.com/office/drawing/2014/main" id="{EBB802B9-F88A-543F-655F-6F4D0B19FEA3}"/>
+          <p:cNvPr id="4" name="Parallelogram 3">
+            <a:extLst>
+              <a:ext uri="{FF2B5EF4-FFF2-40B4-BE49-F238E27FC236}">
+                <a16:creationId xmlns:a16="http://schemas.microsoft.com/office/drawing/2014/main" id="{1AE01DBA-F45B-E26C-6B7B-5DDD82F4AC45}"/>
               </a:ext>
             </a:extLst>
           </p:cNvPr>
@@ -882,14 +662,14 @@
         </p:nvSpPr>
         <p:spPr>
           <a:xfrm>
-            <a:off x="0" y="101176"/>
-            <a:ext cx="12191999" cy="827008"/>
-          </a:xfrm>
-          <a:prstGeom prst="rect">
-            <a:avLst/>
-          </a:prstGeom>
-          <a:solidFill>
-            <a:srgbClr val="245391"/>
+            <a:off x="11208471" y="159685"/>
+            <a:ext cx="848382" cy="709988"/>
+          </a:xfrm>
+          <a:prstGeom prst="parallelogram">
+            <a:avLst/>
+          </a:prstGeom>
+          <a:solidFill>
+            <a:srgbClr val="F4DB52"/>
           </a:solidFill>
           <a:ln>
             <a:noFill/>
@@ -920,1648 +700,6 @@
           </a:p>
         </p:txBody>
       </p:sp>
-      <p:sp>
-        <p:nvSpPr>
-          <p:cNvPr id="12" name="Title 1">
-            <a:extLst>
-              <a:ext uri="{FF2B5EF4-FFF2-40B4-BE49-F238E27FC236}">
-                <a16:creationId xmlns:a16="http://schemas.microsoft.com/office/drawing/2014/main" id="{661E29F3-04F3-2EEC-DB5E-CE1144A482CA}"/>
-              </a:ext>
-            </a:extLst>
-          </p:cNvPr>
-          <p:cNvSpPr>
-            <a:spLocks noGrp="1"/>
-          </p:cNvSpPr>
-          <p:nvPr>
-            <p:ph type="title"/>
-          </p:nvPr>
-        </p:nvSpPr>
-        <p:spPr>
-          <a:xfrm>
-            <a:off x="326590" y="101175"/>
-            <a:ext cx="10881880" cy="827009"/>
-          </a:xfrm>
-          <a:prstGeom prst="rect">
-            <a:avLst/>
-          </a:prstGeom>
-          <a:solidFill>
-            <a:srgbClr val="245391"/>
-          </a:solidFill>
-        </p:spPr>
-        <p:txBody>
-          <a:bodyPr>
-            <a:normAutofit/>
-          </a:bodyPr>
-          <a:lstStyle>
-            <a:lvl1pPr marL="0" indent="0">
-              <a:defRPr sz="3200" b="1">
-                <a:solidFill>
-                  <a:schemeClr val="bg1"/>
-                </a:solidFill>
-              </a:defRPr>
-            </a:lvl1pPr>
-          </a:lstStyle>
-          <a:p>
-            <a:r>
-              <a:rPr lang="en-US"/>
-              <a:t>Click to edit Master title style</a:t>
-            </a:r>
-            <a:endParaRPr lang="en-GB" dirty="0"/>
-          </a:p>
-        </p:txBody>
-      </p:sp>
-      <p:sp>
-        <p:nvSpPr>
-          <p:cNvPr id="13" name="Slide Number Placeholder 5">
-            <a:extLst>
-              <a:ext uri="{FF2B5EF4-FFF2-40B4-BE49-F238E27FC236}">
-                <a16:creationId xmlns:a16="http://schemas.microsoft.com/office/drawing/2014/main" id="{B0D63A05-1B5F-F916-3C25-1C57B251A0A9}"/>
-              </a:ext>
-            </a:extLst>
-          </p:cNvPr>
-          <p:cNvSpPr>
-            <a:spLocks noGrp="1"/>
-          </p:cNvSpPr>
-          <p:nvPr>
-            <p:ph type="sldNum" sz="quarter" idx="10"/>
-          </p:nvPr>
-        </p:nvSpPr>
-        <p:spPr>
-          <a:xfrm>
-            <a:off x="11484634" y="6650966"/>
-            <a:ext cx="370936" cy="207034"/>
-          </a:xfrm>
-          <a:prstGeom prst="rect">
-            <a:avLst/>
-          </a:prstGeom>
-        </p:spPr>
-        <p:txBody>
-          <a:bodyPr/>
-          <a:lstStyle>
-            <a:lvl1pPr algn="r">
-              <a:defRPr sz="1000">
-                <a:solidFill>
-                  <a:schemeClr val="bg1"/>
-                </a:solidFill>
-              </a:defRPr>
-            </a:lvl1pPr>
-          </a:lstStyle>
-          <a:p>
-            <a:fld id="{7767393B-85A6-40C1-AB65-A74DA355DB56}" type="slidenum">
-              <a:rPr lang="en-GB" smtClean="0"/>
-              <a:pPr/>
-              <a:t>‹#›</a:t>
-            </a:fld>
-            <a:endParaRPr lang="en-GB"/>
-          </a:p>
-        </p:txBody>
-      </p:sp>
-      <p:sp>
-        <p:nvSpPr>
-          <p:cNvPr id="10" name="Parallelogram 9">
-            <a:extLst>
-              <a:ext uri="{FF2B5EF4-FFF2-40B4-BE49-F238E27FC236}">
-                <a16:creationId xmlns:a16="http://schemas.microsoft.com/office/drawing/2014/main" id="{54247249-9BE4-3BEC-6B23-7ADD02874617}"/>
-              </a:ext>
-            </a:extLst>
-          </p:cNvPr>
-          <p:cNvSpPr/>
-          <p:nvPr/>
-        </p:nvSpPr>
-        <p:spPr>
-          <a:xfrm>
-            <a:off x="11208471" y="159685"/>
-            <a:ext cx="848382" cy="709988"/>
-          </a:xfrm>
-          <a:prstGeom prst="parallelogram">
-            <a:avLst/>
-          </a:prstGeom>
-          <a:solidFill>
-            <a:srgbClr val="F4DB52"/>
-          </a:solidFill>
-          <a:ln>
-            <a:noFill/>
-          </a:ln>
-        </p:spPr>
-        <p:style>
-          <a:lnRef idx="2">
-            <a:schemeClr val="accent1">
-              <a:shade val="50000"/>
-            </a:schemeClr>
-          </a:lnRef>
-          <a:fillRef idx="1">
-            <a:schemeClr val="accent1"/>
-          </a:fillRef>
-          <a:effectRef idx="0">
-            <a:schemeClr val="accent1"/>
-          </a:effectRef>
-          <a:fontRef idx="minor">
-            <a:schemeClr val="lt1"/>
-          </a:fontRef>
-        </p:style>
-        <p:txBody>
-          <a:bodyPr rtlCol="0" anchor="ctr"/>
-          <a:lstStyle/>
-          <a:p>
-            <a:pPr algn="ctr"/>
-            <a:endParaRPr lang="en-GB"/>
-          </a:p>
-        </p:txBody>
-      </p:sp>
-      <p:pic>
-        <p:nvPicPr>
-          <p:cNvPr id="14" name="Graphic 13">
-            <a:extLst>
-              <a:ext uri="{FF2B5EF4-FFF2-40B4-BE49-F238E27FC236}">
-                <a16:creationId xmlns:a16="http://schemas.microsoft.com/office/drawing/2014/main" id="{D29499FA-932A-0653-24D8-F298B96B8D1C}"/>
-              </a:ext>
-            </a:extLst>
-          </p:cNvPr>
-          <p:cNvPicPr>
-            <a:picLocks noChangeAspect="1"/>
-          </p:cNvPicPr>
-          <p:nvPr/>
-        </p:nvPicPr>
-        <p:blipFill>
-          <a:blip r:embed="rId2">
-            <a:extLst>
-              <a:ext uri="{28A0092B-C50C-407E-A947-70E740481C1C}">
-                <a14:useLocalDpi xmlns:a14="http://schemas.microsoft.com/office/drawing/2010/main" val="0"/>
-              </a:ext>
-              <a:ext uri="{96DAC541-7B7A-43D3-8B79-37D633B846F1}">
-                <asvg:svgBlip xmlns:asvg="http://schemas.microsoft.com/office/drawing/2016/SVG/main" r:embed="rId3"/>
-              </a:ext>
-            </a:extLst>
-          </a:blip>
-          <a:stretch>
-            <a:fillRect/>
-          </a:stretch>
-        </p:blipFill>
-        <p:spPr>
-          <a:xfrm>
-            <a:off x="11419250" y="203307"/>
-            <a:ext cx="426823" cy="622742"/>
-          </a:xfrm>
-          <a:prstGeom prst="rect">
-            <a:avLst/>
-          </a:prstGeom>
-        </p:spPr>
-      </p:pic>
-    </p:spTree>
-    <p:extLst>
-      <p:ext uri="{BB962C8B-B14F-4D97-AF65-F5344CB8AC3E}">
-        <p14:creationId xmlns:p14="http://schemas.microsoft.com/office/powerpoint/2010/main" val="1177837866"/>
-      </p:ext>
-    </p:extLst>
-  </p:cSld>
-  <p:clrMapOvr>
-    <a:masterClrMapping/>
-  </p:clrMapOvr>
-</p:sldLayout>
-</file>
-
-<file path=ppt/slideLayouts/slideLayout11.xml><?xml version="1.0" encoding="utf-8"?>
-<p:sldLayout xmlns:a="http://schemas.openxmlformats.org/drawingml/2006/main" xmlns:r="http://schemas.openxmlformats.org/officeDocument/2006/relationships" xmlns:p="http://schemas.openxmlformats.org/presentationml/2006/main" preserve="1">
-  <p:cSld name="Comparison - Green Sub-Header">
-    <p:spTree>
-      <p:nvGrpSpPr>
-        <p:cNvPr id="1" name=""/>
-        <p:cNvGrpSpPr/>
-        <p:nvPr/>
-      </p:nvGrpSpPr>
-      <p:grpSpPr>
-        <a:xfrm>
-          <a:off x="0" y="0"/>
-          <a:ext cx="0" cy="0"/>
-          <a:chOff x="0" y="0"/>
-          <a:chExt cx="0" cy="0"/>
-        </a:xfrm>
-      </p:grpSpPr>
-      <p:sp>
-        <p:nvSpPr>
-          <p:cNvPr id="3" name="Text Placeholder 2">
-            <a:extLst>
-              <a:ext uri="{FF2B5EF4-FFF2-40B4-BE49-F238E27FC236}">
-                <a16:creationId xmlns:a16="http://schemas.microsoft.com/office/drawing/2014/main" id="{A7EE70C0-0004-DA5B-411C-22A2E3426F32}"/>
-              </a:ext>
-            </a:extLst>
-          </p:cNvPr>
-          <p:cNvSpPr>
-            <a:spLocks noGrp="1"/>
-          </p:cNvSpPr>
-          <p:nvPr>
-            <p:ph type="body" idx="1"/>
-          </p:nvPr>
-        </p:nvSpPr>
-        <p:spPr>
-          <a:xfrm>
-            <a:off x="326590" y="1150069"/>
-            <a:ext cx="5693210" cy="659877"/>
-          </a:xfrm>
-          <a:prstGeom prst="rect">
-            <a:avLst/>
-          </a:prstGeom>
-          <a:solidFill>
-            <a:srgbClr val="4AAF55"/>
-          </a:solidFill>
-        </p:spPr>
-        <p:txBody>
-          <a:bodyPr anchor="b"/>
-          <a:lstStyle>
-            <a:lvl1pPr marL="0" indent="0">
-              <a:buNone/>
-              <a:defRPr sz="2800" b="1">
-                <a:solidFill>
-                  <a:schemeClr val="bg1"/>
-                </a:solidFill>
-              </a:defRPr>
-            </a:lvl1pPr>
-            <a:lvl2pPr marL="457200" indent="0">
-              <a:buNone/>
-              <a:defRPr sz="2000" b="1"/>
-            </a:lvl2pPr>
-            <a:lvl3pPr marL="914400" indent="0">
-              <a:buNone/>
-              <a:defRPr sz="1800" b="1"/>
-            </a:lvl3pPr>
-            <a:lvl4pPr marL="1371600" indent="0">
-              <a:buNone/>
-              <a:defRPr sz="1600" b="1"/>
-            </a:lvl4pPr>
-            <a:lvl5pPr marL="1828800" indent="0">
-              <a:buNone/>
-              <a:defRPr sz="1600" b="1"/>
-            </a:lvl5pPr>
-            <a:lvl6pPr marL="2286000" indent="0">
-              <a:buNone/>
-              <a:defRPr sz="1600" b="1"/>
-            </a:lvl6pPr>
-            <a:lvl7pPr marL="2743200" indent="0">
-              <a:buNone/>
-              <a:defRPr sz="1600" b="1"/>
-            </a:lvl7pPr>
-            <a:lvl8pPr marL="3200400" indent="0">
-              <a:buNone/>
-              <a:defRPr sz="1600" b="1"/>
-            </a:lvl8pPr>
-            <a:lvl9pPr marL="3657600" indent="0">
-              <a:buNone/>
-              <a:defRPr sz="1600" b="1"/>
-            </a:lvl9pPr>
-          </a:lstStyle>
-          <a:p>
-            <a:pPr lvl="0"/>
-            <a:r>
-              <a:rPr lang="en-US"/>
-              <a:t>Click to edit Master text styles</a:t>
-            </a:r>
-          </a:p>
-        </p:txBody>
-      </p:sp>
-      <p:sp>
-        <p:nvSpPr>
-          <p:cNvPr id="4" name="Content Placeholder 3">
-            <a:extLst>
-              <a:ext uri="{FF2B5EF4-FFF2-40B4-BE49-F238E27FC236}">
-                <a16:creationId xmlns:a16="http://schemas.microsoft.com/office/drawing/2014/main" id="{433E7C9F-2EEC-6475-AE93-1246752B2204}"/>
-              </a:ext>
-            </a:extLst>
-          </p:cNvPr>
-          <p:cNvSpPr>
-            <a:spLocks noGrp="1"/>
-          </p:cNvSpPr>
-          <p:nvPr>
-            <p:ph sz="half" idx="2"/>
-          </p:nvPr>
-        </p:nvSpPr>
-        <p:spPr>
-          <a:xfrm>
-            <a:off x="326590" y="1809946"/>
-            <a:ext cx="5693210" cy="4619134"/>
-          </a:xfrm>
-          <a:prstGeom prst="rect">
-            <a:avLst/>
-          </a:prstGeom>
-        </p:spPr>
-        <p:txBody>
-          <a:bodyPr/>
-          <a:lstStyle/>
-          <a:p>
-            <a:pPr lvl="0"/>
-            <a:r>
-              <a:rPr lang="en-US"/>
-              <a:t>Click to edit Master text styles</a:t>
-            </a:r>
-          </a:p>
-          <a:p>
-            <a:pPr lvl="1"/>
-            <a:r>
-              <a:rPr lang="en-US"/>
-              <a:t>Second level</a:t>
-            </a:r>
-          </a:p>
-          <a:p>
-            <a:pPr lvl="2"/>
-            <a:r>
-              <a:rPr lang="en-US"/>
-              <a:t>Third level</a:t>
-            </a:r>
-          </a:p>
-          <a:p>
-            <a:pPr lvl="3"/>
-            <a:r>
-              <a:rPr lang="en-US"/>
-              <a:t>Fourth level</a:t>
-            </a:r>
-          </a:p>
-          <a:p>
-            <a:pPr lvl="4"/>
-            <a:r>
-              <a:rPr lang="en-US"/>
-              <a:t>Fifth level</a:t>
-            </a:r>
-            <a:endParaRPr lang="en-GB" dirty="0"/>
-          </a:p>
-        </p:txBody>
-      </p:sp>
-      <p:sp>
-        <p:nvSpPr>
-          <p:cNvPr id="5" name="Text Placeholder 4">
-            <a:extLst>
-              <a:ext uri="{FF2B5EF4-FFF2-40B4-BE49-F238E27FC236}">
-                <a16:creationId xmlns:a16="http://schemas.microsoft.com/office/drawing/2014/main" id="{6581B006-631F-4BB6-7AFB-4D358EC005E0}"/>
-              </a:ext>
-            </a:extLst>
-          </p:cNvPr>
-          <p:cNvSpPr>
-            <a:spLocks noGrp="1"/>
-          </p:cNvSpPr>
-          <p:nvPr>
-            <p:ph type="body" sz="quarter" idx="3"/>
-          </p:nvPr>
-        </p:nvSpPr>
-        <p:spPr>
-          <a:xfrm>
-            <a:off x="6172199" y="1150069"/>
-            <a:ext cx="5683371" cy="659877"/>
-          </a:xfrm>
-          <a:prstGeom prst="rect">
-            <a:avLst/>
-          </a:prstGeom>
-          <a:solidFill>
-            <a:srgbClr val="4AAF55"/>
-          </a:solidFill>
-        </p:spPr>
-        <p:txBody>
-          <a:bodyPr vert="horz" lIns="91440" tIns="45720" rIns="91440" bIns="45720" rtlCol="0" anchor="b">
-            <a:normAutofit/>
-          </a:bodyPr>
-          <a:lstStyle>
-            <a:lvl1pPr>
-              <a:defRPr lang="en-US" b="1" dirty="0">
-                <a:solidFill>
-                  <a:schemeClr val="bg1"/>
-                </a:solidFill>
-              </a:defRPr>
-            </a:lvl1pPr>
-          </a:lstStyle>
-          <a:p>
-            <a:pPr marL="0" lvl="0" indent="0">
-              <a:buNone/>
-            </a:pPr>
-            <a:r>
-              <a:rPr lang="en-US"/>
-              <a:t>Click to edit Master text styles</a:t>
-            </a:r>
-          </a:p>
-        </p:txBody>
-      </p:sp>
-      <p:sp>
-        <p:nvSpPr>
-          <p:cNvPr id="6" name="Content Placeholder 5">
-            <a:extLst>
-              <a:ext uri="{FF2B5EF4-FFF2-40B4-BE49-F238E27FC236}">
-                <a16:creationId xmlns:a16="http://schemas.microsoft.com/office/drawing/2014/main" id="{4D14FAB4-C3D5-5802-AC62-3F1B0FEE0444}"/>
-              </a:ext>
-            </a:extLst>
-          </p:cNvPr>
-          <p:cNvSpPr>
-            <a:spLocks noGrp="1"/>
-          </p:cNvSpPr>
-          <p:nvPr>
-            <p:ph sz="quarter" idx="4"/>
-          </p:nvPr>
-        </p:nvSpPr>
-        <p:spPr>
-          <a:xfrm>
-            <a:off x="6172199" y="1809946"/>
-            <a:ext cx="5673525" cy="4619134"/>
-          </a:xfrm>
-          <a:prstGeom prst="rect">
-            <a:avLst/>
-          </a:prstGeom>
-        </p:spPr>
-        <p:txBody>
-          <a:bodyPr/>
-          <a:lstStyle/>
-          <a:p>
-            <a:pPr lvl="0"/>
-            <a:r>
-              <a:rPr lang="en-US"/>
-              <a:t>Click to edit Master text styles</a:t>
-            </a:r>
-          </a:p>
-          <a:p>
-            <a:pPr lvl="1"/>
-            <a:r>
-              <a:rPr lang="en-US"/>
-              <a:t>Second level</a:t>
-            </a:r>
-          </a:p>
-          <a:p>
-            <a:pPr lvl="2"/>
-            <a:r>
-              <a:rPr lang="en-US"/>
-              <a:t>Third level</a:t>
-            </a:r>
-          </a:p>
-          <a:p>
-            <a:pPr lvl="3"/>
-            <a:r>
-              <a:rPr lang="en-US"/>
-              <a:t>Fourth level</a:t>
-            </a:r>
-          </a:p>
-          <a:p>
-            <a:pPr lvl="4"/>
-            <a:r>
-              <a:rPr lang="en-US"/>
-              <a:t>Fifth level</a:t>
-            </a:r>
-            <a:endParaRPr lang="en-GB"/>
-          </a:p>
-        </p:txBody>
-      </p:sp>
-      <p:sp>
-        <p:nvSpPr>
-          <p:cNvPr id="11" name="Rectangle 10">
-            <a:extLst>
-              <a:ext uri="{FF2B5EF4-FFF2-40B4-BE49-F238E27FC236}">
-                <a16:creationId xmlns:a16="http://schemas.microsoft.com/office/drawing/2014/main" id="{EBB802B9-F88A-543F-655F-6F4D0B19FEA3}"/>
-              </a:ext>
-            </a:extLst>
-          </p:cNvPr>
-          <p:cNvSpPr/>
-          <p:nvPr/>
-        </p:nvSpPr>
-        <p:spPr>
-          <a:xfrm>
-            <a:off x="0" y="101176"/>
-            <a:ext cx="12191999" cy="827008"/>
-          </a:xfrm>
-          <a:prstGeom prst="rect">
-            <a:avLst/>
-          </a:prstGeom>
-          <a:solidFill>
-            <a:srgbClr val="245391"/>
-          </a:solidFill>
-          <a:ln>
-            <a:noFill/>
-          </a:ln>
-        </p:spPr>
-        <p:style>
-          <a:lnRef idx="2">
-            <a:schemeClr val="accent1">
-              <a:shade val="50000"/>
-            </a:schemeClr>
-          </a:lnRef>
-          <a:fillRef idx="1">
-            <a:schemeClr val="accent1"/>
-          </a:fillRef>
-          <a:effectRef idx="0">
-            <a:schemeClr val="accent1"/>
-          </a:effectRef>
-          <a:fontRef idx="minor">
-            <a:schemeClr val="lt1"/>
-          </a:fontRef>
-        </p:style>
-        <p:txBody>
-          <a:bodyPr rtlCol="0" anchor="ctr"/>
-          <a:lstStyle/>
-          <a:p>
-            <a:pPr algn="ctr"/>
-            <a:endParaRPr lang="en-GB"/>
-          </a:p>
-        </p:txBody>
-      </p:sp>
-      <p:sp>
-        <p:nvSpPr>
-          <p:cNvPr id="12" name="Title 1">
-            <a:extLst>
-              <a:ext uri="{FF2B5EF4-FFF2-40B4-BE49-F238E27FC236}">
-                <a16:creationId xmlns:a16="http://schemas.microsoft.com/office/drawing/2014/main" id="{661E29F3-04F3-2EEC-DB5E-CE1144A482CA}"/>
-              </a:ext>
-            </a:extLst>
-          </p:cNvPr>
-          <p:cNvSpPr>
-            <a:spLocks noGrp="1"/>
-          </p:cNvSpPr>
-          <p:nvPr>
-            <p:ph type="title"/>
-          </p:nvPr>
-        </p:nvSpPr>
-        <p:spPr>
-          <a:xfrm>
-            <a:off x="326590" y="101175"/>
-            <a:ext cx="10881880" cy="827009"/>
-          </a:xfrm>
-          <a:prstGeom prst="rect">
-            <a:avLst/>
-          </a:prstGeom>
-          <a:solidFill>
-            <a:srgbClr val="245391"/>
-          </a:solidFill>
-        </p:spPr>
-        <p:txBody>
-          <a:bodyPr>
-            <a:normAutofit/>
-          </a:bodyPr>
-          <a:lstStyle>
-            <a:lvl1pPr marL="0" indent="0">
-              <a:defRPr sz="3200" b="1">
-                <a:solidFill>
-                  <a:schemeClr val="bg1"/>
-                </a:solidFill>
-              </a:defRPr>
-            </a:lvl1pPr>
-          </a:lstStyle>
-          <a:p>
-            <a:r>
-              <a:rPr lang="en-US"/>
-              <a:t>Click to edit Master title style</a:t>
-            </a:r>
-            <a:endParaRPr lang="en-GB" dirty="0"/>
-          </a:p>
-        </p:txBody>
-      </p:sp>
-      <p:sp>
-        <p:nvSpPr>
-          <p:cNvPr id="13" name="Slide Number Placeholder 5">
-            <a:extLst>
-              <a:ext uri="{FF2B5EF4-FFF2-40B4-BE49-F238E27FC236}">
-                <a16:creationId xmlns:a16="http://schemas.microsoft.com/office/drawing/2014/main" id="{B0D63A05-1B5F-F916-3C25-1C57B251A0A9}"/>
-              </a:ext>
-            </a:extLst>
-          </p:cNvPr>
-          <p:cNvSpPr>
-            <a:spLocks noGrp="1"/>
-          </p:cNvSpPr>
-          <p:nvPr>
-            <p:ph type="sldNum" sz="quarter" idx="10"/>
-          </p:nvPr>
-        </p:nvSpPr>
-        <p:spPr>
-          <a:xfrm>
-            <a:off x="11484634" y="6650966"/>
-            <a:ext cx="370936" cy="207034"/>
-          </a:xfrm>
-          <a:prstGeom prst="rect">
-            <a:avLst/>
-          </a:prstGeom>
-        </p:spPr>
-        <p:txBody>
-          <a:bodyPr/>
-          <a:lstStyle>
-            <a:lvl1pPr algn="r">
-              <a:defRPr sz="1000">
-                <a:solidFill>
-                  <a:schemeClr val="bg1"/>
-                </a:solidFill>
-              </a:defRPr>
-            </a:lvl1pPr>
-          </a:lstStyle>
-          <a:p>
-            <a:fld id="{7767393B-85A6-40C1-AB65-A74DA355DB56}" type="slidenum">
-              <a:rPr lang="en-GB" smtClean="0"/>
-              <a:pPr/>
-              <a:t>‹#›</a:t>
-            </a:fld>
-            <a:endParaRPr lang="en-GB"/>
-          </a:p>
-        </p:txBody>
-      </p:sp>
-      <p:sp>
-        <p:nvSpPr>
-          <p:cNvPr id="10" name="Parallelogram 9">
-            <a:extLst>
-              <a:ext uri="{FF2B5EF4-FFF2-40B4-BE49-F238E27FC236}">
-                <a16:creationId xmlns:a16="http://schemas.microsoft.com/office/drawing/2014/main" id="{CC5E6040-7AC2-C620-97E5-AC059CA0A8CF}"/>
-              </a:ext>
-            </a:extLst>
-          </p:cNvPr>
-          <p:cNvSpPr/>
-          <p:nvPr/>
-        </p:nvSpPr>
-        <p:spPr>
-          <a:xfrm>
-            <a:off x="11208471" y="159685"/>
-            <a:ext cx="848382" cy="709988"/>
-          </a:xfrm>
-          <a:prstGeom prst="parallelogram">
-            <a:avLst/>
-          </a:prstGeom>
-          <a:solidFill>
-            <a:srgbClr val="F4DB52"/>
-          </a:solidFill>
-          <a:ln>
-            <a:noFill/>
-          </a:ln>
-        </p:spPr>
-        <p:style>
-          <a:lnRef idx="2">
-            <a:schemeClr val="accent1">
-              <a:shade val="50000"/>
-            </a:schemeClr>
-          </a:lnRef>
-          <a:fillRef idx="1">
-            <a:schemeClr val="accent1"/>
-          </a:fillRef>
-          <a:effectRef idx="0">
-            <a:schemeClr val="accent1"/>
-          </a:effectRef>
-          <a:fontRef idx="minor">
-            <a:schemeClr val="lt1"/>
-          </a:fontRef>
-        </p:style>
-        <p:txBody>
-          <a:bodyPr rtlCol="0" anchor="ctr"/>
-          <a:lstStyle/>
-          <a:p>
-            <a:pPr algn="ctr"/>
-            <a:endParaRPr lang="en-GB"/>
-          </a:p>
-        </p:txBody>
-      </p:sp>
-      <p:pic>
-        <p:nvPicPr>
-          <p:cNvPr id="14" name="Graphic 13">
-            <a:extLst>
-              <a:ext uri="{FF2B5EF4-FFF2-40B4-BE49-F238E27FC236}">
-                <a16:creationId xmlns:a16="http://schemas.microsoft.com/office/drawing/2014/main" id="{6FD705B2-C969-2978-EE41-B6888CFF5746}"/>
-              </a:ext>
-            </a:extLst>
-          </p:cNvPr>
-          <p:cNvPicPr>
-            <a:picLocks noChangeAspect="1"/>
-          </p:cNvPicPr>
-          <p:nvPr/>
-        </p:nvPicPr>
-        <p:blipFill>
-          <a:blip r:embed="rId2">
-            <a:extLst>
-              <a:ext uri="{28A0092B-C50C-407E-A947-70E740481C1C}">
-                <a14:useLocalDpi xmlns:a14="http://schemas.microsoft.com/office/drawing/2010/main" val="0"/>
-              </a:ext>
-              <a:ext uri="{96DAC541-7B7A-43D3-8B79-37D633B846F1}">
-                <asvg:svgBlip xmlns:asvg="http://schemas.microsoft.com/office/drawing/2016/SVG/main" r:embed="rId3"/>
-              </a:ext>
-            </a:extLst>
-          </a:blip>
-          <a:stretch>
-            <a:fillRect/>
-          </a:stretch>
-        </p:blipFill>
-        <p:spPr>
-          <a:xfrm>
-            <a:off x="11419250" y="203307"/>
-            <a:ext cx="426823" cy="622742"/>
-          </a:xfrm>
-          <a:prstGeom prst="rect">
-            <a:avLst/>
-          </a:prstGeom>
-        </p:spPr>
-      </p:pic>
-    </p:spTree>
-    <p:extLst>
-      <p:ext uri="{BB962C8B-B14F-4D97-AF65-F5344CB8AC3E}">
-        <p14:creationId xmlns:p14="http://schemas.microsoft.com/office/powerpoint/2010/main" val="2045897835"/>
-      </p:ext>
-    </p:extLst>
-  </p:cSld>
-  <p:clrMapOvr>
-    <a:masterClrMapping/>
-  </p:clrMapOvr>
-</p:sldLayout>
-</file>
-
-<file path=ppt/slideLayouts/slideLayout12.xml><?xml version="1.0" encoding="utf-8"?>
-<p:sldLayout xmlns:a="http://schemas.openxmlformats.org/drawingml/2006/main" xmlns:r="http://schemas.openxmlformats.org/officeDocument/2006/relationships" xmlns:p="http://schemas.openxmlformats.org/presentationml/2006/main" preserve="1">
-  <p:cSld name="Comparison - No Colour">
-    <p:spTree>
-      <p:nvGrpSpPr>
-        <p:cNvPr id="1" name=""/>
-        <p:cNvGrpSpPr/>
-        <p:nvPr/>
-      </p:nvGrpSpPr>
-      <p:grpSpPr>
-        <a:xfrm>
-          <a:off x="0" y="0"/>
-          <a:ext cx="0" cy="0"/>
-          <a:chOff x="0" y="0"/>
-          <a:chExt cx="0" cy="0"/>
-        </a:xfrm>
-      </p:grpSpPr>
-      <p:sp>
-        <p:nvSpPr>
-          <p:cNvPr id="3" name="Text Placeholder 2">
-            <a:extLst>
-              <a:ext uri="{FF2B5EF4-FFF2-40B4-BE49-F238E27FC236}">
-                <a16:creationId xmlns:a16="http://schemas.microsoft.com/office/drawing/2014/main" id="{A7EE70C0-0004-DA5B-411C-22A2E3426F32}"/>
-              </a:ext>
-            </a:extLst>
-          </p:cNvPr>
-          <p:cNvSpPr>
-            <a:spLocks noGrp="1"/>
-          </p:cNvSpPr>
-          <p:nvPr>
-            <p:ph type="body" idx="1"/>
-          </p:nvPr>
-        </p:nvSpPr>
-        <p:spPr>
-          <a:xfrm>
-            <a:off x="326590" y="1150069"/>
-            <a:ext cx="5693210" cy="659877"/>
-          </a:xfrm>
-          <a:prstGeom prst="rect">
-            <a:avLst/>
-          </a:prstGeom>
-          <a:noFill/>
-        </p:spPr>
-        <p:txBody>
-          <a:bodyPr anchor="b"/>
-          <a:lstStyle>
-            <a:lvl1pPr marL="0" indent="0">
-              <a:buNone/>
-              <a:defRPr sz="2800" b="1">
-                <a:solidFill>
-                  <a:schemeClr val="tx1"/>
-                </a:solidFill>
-              </a:defRPr>
-            </a:lvl1pPr>
-            <a:lvl2pPr marL="457200" indent="0">
-              <a:buNone/>
-              <a:defRPr sz="2000" b="1"/>
-            </a:lvl2pPr>
-            <a:lvl3pPr marL="914400" indent="0">
-              <a:buNone/>
-              <a:defRPr sz="1800" b="1"/>
-            </a:lvl3pPr>
-            <a:lvl4pPr marL="1371600" indent="0">
-              <a:buNone/>
-              <a:defRPr sz="1600" b="1"/>
-            </a:lvl4pPr>
-            <a:lvl5pPr marL="1828800" indent="0">
-              <a:buNone/>
-              <a:defRPr sz="1600" b="1"/>
-            </a:lvl5pPr>
-            <a:lvl6pPr marL="2286000" indent="0">
-              <a:buNone/>
-              <a:defRPr sz="1600" b="1"/>
-            </a:lvl6pPr>
-            <a:lvl7pPr marL="2743200" indent="0">
-              <a:buNone/>
-              <a:defRPr sz="1600" b="1"/>
-            </a:lvl7pPr>
-            <a:lvl8pPr marL="3200400" indent="0">
-              <a:buNone/>
-              <a:defRPr sz="1600" b="1"/>
-            </a:lvl8pPr>
-            <a:lvl9pPr marL="3657600" indent="0">
-              <a:buNone/>
-              <a:defRPr sz="1600" b="1"/>
-            </a:lvl9pPr>
-          </a:lstStyle>
-          <a:p>
-            <a:pPr lvl="0"/>
-            <a:r>
-              <a:rPr lang="en-US"/>
-              <a:t>Click to edit Master text styles</a:t>
-            </a:r>
-          </a:p>
-        </p:txBody>
-      </p:sp>
-      <p:sp>
-        <p:nvSpPr>
-          <p:cNvPr id="4" name="Content Placeholder 3">
-            <a:extLst>
-              <a:ext uri="{FF2B5EF4-FFF2-40B4-BE49-F238E27FC236}">
-                <a16:creationId xmlns:a16="http://schemas.microsoft.com/office/drawing/2014/main" id="{433E7C9F-2EEC-6475-AE93-1246752B2204}"/>
-              </a:ext>
-            </a:extLst>
-          </p:cNvPr>
-          <p:cNvSpPr>
-            <a:spLocks noGrp="1"/>
-          </p:cNvSpPr>
-          <p:nvPr>
-            <p:ph sz="half" idx="2"/>
-          </p:nvPr>
-        </p:nvSpPr>
-        <p:spPr>
-          <a:xfrm>
-            <a:off x="326590" y="1809946"/>
-            <a:ext cx="5693210" cy="4619134"/>
-          </a:xfrm>
-          <a:prstGeom prst="rect">
-            <a:avLst/>
-          </a:prstGeom>
-        </p:spPr>
-        <p:txBody>
-          <a:bodyPr/>
-          <a:lstStyle/>
-          <a:p>
-            <a:pPr lvl="0"/>
-            <a:r>
-              <a:rPr lang="en-US"/>
-              <a:t>Click to edit Master text styles</a:t>
-            </a:r>
-          </a:p>
-          <a:p>
-            <a:pPr lvl="1"/>
-            <a:r>
-              <a:rPr lang="en-US"/>
-              <a:t>Second level</a:t>
-            </a:r>
-          </a:p>
-          <a:p>
-            <a:pPr lvl="2"/>
-            <a:r>
-              <a:rPr lang="en-US"/>
-              <a:t>Third level</a:t>
-            </a:r>
-          </a:p>
-          <a:p>
-            <a:pPr lvl="3"/>
-            <a:r>
-              <a:rPr lang="en-US"/>
-              <a:t>Fourth level</a:t>
-            </a:r>
-          </a:p>
-          <a:p>
-            <a:pPr lvl="4"/>
-            <a:r>
-              <a:rPr lang="en-US"/>
-              <a:t>Fifth level</a:t>
-            </a:r>
-            <a:endParaRPr lang="en-GB" dirty="0"/>
-          </a:p>
-        </p:txBody>
-      </p:sp>
-      <p:sp>
-        <p:nvSpPr>
-          <p:cNvPr id="5" name="Text Placeholder 4">
-            <a:extLst>
-              <a:ext uri="{FF2B5EF4-FFF2-40B4-BE49-F238E27FC236}">
-                <a16:creationId xmlns:a16="http://schemas.microsoft.com/office/drawing/2014/main" id="{6581B006-631F-4BB6-7AFB-4D358EC005E0}"/>
-              </a:ext>
-            </a:extLst>
-          </p:cNvPr>
-          <p:cNvSpPr>
-            <a:spLocks noGrp="1"/>
-          </p:cNvSpPr>
-          <p:nvPr>
-            <p:ph type="body" sz="quarter" idx="3"/>
-          </p:nvPr>
-        </p:nvSpPr>
-        <p:spPr>
-          <a:xfrm>
-            <a:off x="6172199" y="1150069"/>
-            <a:ext cx="5683371" cy="659877"/>
-          </a:xfrm>
-          <a:prstGeom prst="rect">
-            <a:avLst/>
-          </a:prstGeom>
-          <a:noFill/>
-        </p:spPr>
-        <p:txBody>
-          <a:bodyPr vert="horz" lIns="91440" tIns="45720" rIns="91440" bIns="45720" rtlCol="0" anchor="b">
-            <a:normAutofit/>
-          </a:bodyPr>
-          <a:lstStyle>
-            <a:lvl1pPr>
-              <a:defRPr lang="en-US" b="1" dirty="0"/>
-            </a:lvl1pPr>
-          </a:lstStyle>
-          <a:p>
-            <a:pPr marL="0" lvl="0" indent="0">
-              <a:buNone/>
-            </a:pPr>
-            <a:r>
-              <a:rPr lang="en-US"/>
-              <a:t>Click to edit Master text styles</a:t>
-            </a:r>
-          </a:p>
-        </p:txBody>
-      </p:sp>
-      <p:sp>
-        <p:nvSpPr>
-          <p:cNvPr id="6" name="Content Placeholder 5">
-            <a:extLst>
-              <a:ext uri="{FF2B5EF4-FFF2-40B4-BE49-F238E27FC236}">
-                <a16:creationId xmlns:a16="http://schemas.microsoft.com/office/drawing/2014/main" id="{4D14FAB4-C3D5-5802-AC62-3F1B0FEE0444}"/>
-              </a:ext>
-            </a:extLst>
-          </p:cNvPr>
-          <p:cNvSpPr>
-            <a:spLocks noGrp="1"/>
-          </p:cNvSpPr>
-          <p:nvPr>
-            <p:ph sz="quarter" idx="4"/>
-          </p:nvPr>
-        </p:nvSpPr>
-        <p:spPr>
-          <a:xfrm>
-            <a:off x="6172199" y="1809946"/>
-            <a:ext cx="5673525" cy="4619134"/>
-          </a:xfrm>
-          <a:prstGeom prst="rect">
-            <a:avLst/>
-          </a:prstGeom>
-        </p:spPr>
-        <p:txBody>
-          <a:bodyPr/>
-          <a:lstStyle/>
-          <a:p>
-            <a:pPr lvl="0"/>
-            <a:r>
-              <a:rPr lang="en-US"/>
-              <a:t>Click to edit Master text styles</a:t>
-            </a:r>
-          </a:p>
-          <a:p>
-            <a:pPr lvl="1"/>
-            <a:r>
-              <a:rPr lang="en-US"/>
-              <a:t>Second level</a:t>
-            </a:r>
-          </a:p>
-          <a:p>
-            <a:pPr lvl="2"/>
-            <a:r>
-              <a:rPr lang="en-US"/>
-              <a:t>Third level</a:t>
-            </a:r>
-          </a:p>
-          <a:p>
-            <a:pPr lvl="3"/>
-            <a:r>
-              <a:rPr lang="en-US"/>
-              <a:t>Fourth level</a:t>
-            </a:r>
-          </a:p>
-          <a:p>
-            <a:pPr lvl="4"/>
-            <a:r>
-              <a:rPr lang="en-US"/>
-              <a:t>Fifth level</a:t>
-            </a:r>
-            <a:endParaRPr lang="en-GB"/>
-          </a:p>
-        </p:txBody>
-      </p:sp>
-      <p:sp>
-        <p:nvSpPr>
-          <p:cNvPr id="11" name="Rectangle 10">
-            <a:extLst>
-              <a:ext uri="{FF2B5EF4-FFF2-40B4-BE49-F238E27FC236}">
-                <a16:creationId xmlns:a16="http://schemas.microsoft.com/office/drawing/2014/main" id="{EBB802B9-F88A-543F-655F-6F4D0B19FEA3}"/>
-              </a:ext>
-            </a:extLst>
-          </p:cNvPr>
-          <p:cNvSpPr/>
-          <p:nvPr/>
-        </p:nvSpPr>
-        <p:spPr>
-          <a:xfrm>
-            <a:off x="0" y="101176"/>
-            <a:ext cx="12191999" cy="827008"/>
-          </a:xfrm>
-          <a:prstGeom prst="rect">
-            <a:avLst/>
-          </a:prstGeom>
-          <a:solidFill>
-            <a:srgbClr val="245391"/>
-          </a:solidFill>
-          <a:ln>
-            <a:noFill/>
-          </a:ln>
-        </p:spPr>
-        <p:style>
-          <a:lnRef idx="2">
-            <a:schemeClr val="accent1">
-              <a:shade val="50000"/>
-            </a:schemeClr>
-          </a:lnRef>
-          <a:fillRef idx="1">
-            <a:schemeClr val="accent1"/>
-          </a:fillRef>
-          <a:effectRef idx="0">
-            <a:schemeClr val="accent1"/>
-          </a:effectRef>
-          <a:fontRef idx="minor">
-            <a:schemeClr val="lt1"/>
-          </a:fontRef>
-        </p:style>
-        <p:txBody>
-          <a:bodyPr rtlCol="0" anchor="ctr"/>
-          <a:lstStyle/>
-          <a:p>
-            <a:pPr algn="ctr"/>
-            <a:endParaRPr lang="en-GB"/>
-          </a:p>
-        </p:txBody>
-      </p:sp>
-      <p:sp>
-        <p:nvSpPr>
-          <p:cNvPr id="12" name="Title 1">
-            <a:extLst>
-              <a:ext uri="{FF2B5EF4-FFF2-40B4-BE49-F238E27FC236}">
-                <a16:creationId xmlns:a16="http://schemas.microsoft.com/office/drawing/2014/main" id="{661E29F3-04F3-2EEC-DB5E-CE1144A482CA}"/>
-              </a:ext>
-            </a:extLst>
-          </p:cNvPr>
-          <p:cNvSpPr>
-            <a:spLocks noGrp="1"/>
-          </p:cNvSpPr>
-          <p:nvPr>
-            <p:ph type="title"/>
-          </p:nvPr>
-        </p:nvSpPr>
-        <p:spPr>
-          <a:xfrm>
-            <a:off x="326590" y="101175"/>
-            <a:ext cx="10881880" cy="827009"/>
-          </a:xfrm>
-          <a:prstGeom prst="rect">
-            <a:avLst/>
-          </a:prstGeom>
-          <a:solidFill>
-            <a:srgbClr val="245391"/>
-          </a:solidFill>
-        </p:spPr>
-        <p:txBody>
-          <a:bodyPr>
-            <a:normAutofit/>
-          </a:bodyPr>
-          <a:lstStyle>
-            <a:lvl1pPr marL="0" indent="0">
-              <a:defRPr sz="3200" b="1">
-                <a:solidFill>
-                  <a:schemeClr val="bg1"/>
-                </a:solidFill>
-              </a:defRPr>
-            </a:lvl1pPr>
-          </a:lstStyle>
-          <a:p>
-            <a:r>
-              <a:rPr lang="en-US"/>
-              <a:t>Click to edit Master title style</a:t>
-            </a:r>
-            <a:endParaRPr lang="en-GB" dirty="0"/>
-          </a:p>
-        </p:txBody>
-      </p:sp>
-      <p:sp>
-        <p:nvSpPr>
-          <p:cNvPr id="13" name="Slide Number Placeholder 5">
-            <a:extLst>
-              <a:ext uri="{FF2B5EF4-FFF2-40B4-BE49-F238E27FC236}">
-                <a16:creationId xmlns:a16="http://schemas.microsoft.com/office/drawing/2014/main" id="{B0D63A05-1B5F-F916-3C25-1C57B251A0A9}"/>
-              </a:ext>
-            </a:extLst>
-          </p:cNvPr>
-          <p:cNvSpPr>
-            <a:spLocks noGrp="1"/>
-          </p:cNvSpPr>
-          <p:nvPr>
-            <p:ph type="sldNum" sz="quarter" idx="10"/>
-          </p:nvPr>
-        </p:nvSpPr>
-        <p:spPr>
-          <a:xfrm>
-            <a:off x="11484634" y="6650966"/>
-            <a:ext cx="370936" cy="207034"/>
-          </a:xfrm>
-          <a:prstGeom prst="rect">
-            <a:avLst/>
-          </a:prstGeom>
-        </p:spPr>
-        <p:txBody>
-          <a:bodyPr/>
-          <a:lstStyle>
-            <a:lvl1pPr algn="r">
-              <a:defRPr sz="1000">
-                <a:solidFill>
-                  <a:schemeClr val="bg1"/>
-                </a:solidFill>
-              </a:defRPr>
-            </a:lvl1pPr>
-          </a:lstStyle>
-          <a:p>
-            <a:fld id="{7767393B-85A6-40C1-AB65-A74DA355DB56}" type="slidenum">
-              <a:rPr lang="en-GB" smtClean="0"/>
-              <a:pPr/>
-              <a:t>‹#›</a:t>
-            </a:fld>
-            <a:endParaRPr lang="en-GB"/>
-          </a:p>
-        </p:txBody>
-      </p:sp>
-      <p:sp>
-        <p:nvSpPr>
-          <p:cNvPr id="10" name="Parallelogram 9">
-            <a:extLst>
-              <a:ext uri="{FF2B5EF4-FFF2-40B4-BE49-F238E27FC236}">
-                <a16:creationId xmlns:a16="http://schemas.microsoft.com/office/drawing/2014/main" id="{F0247E3A-CE97-5F64-EC7B-5C5C7E7BD2EB}"/>
-              </a:ext>
-            </a:extLst>
-          </p:cNvPr>
-          <p:cNvSpPr/>
-          <p:nvPr/>
-        </p:nvSpPr>
-        <p:spPr>
-          <a:xfrm>
-            <a:off x="11208471" y="159685"/>
-            <a:ext cx="848382" cy="709988"/>
-          </a:xfrm>
-          <a:prstGeom prst="parallelogram">
-            <a:avLst/>
-          </a:prstGeom>
-          <a:solidFill>
-            <a:srgbClr val="F4DB52"/>
-          </a:solidFill>
-          <a:ln>
-            <a:noFill/>
-          </a:ln>
-        </p:spPr>
-        <p:style>
-          <a:lnRef idx="2">
-            <a:schemeClr val="accent1">
-              <a:shade val="50000"/>
-            </a:schemeClr>
-          </a:lnRef>
-          <a:fillRef idx="1">
-            <a:schemeClr val="accent1"/>
-          </a:fillRef>
-          <a:effectRef idx="0">
-            <a:schemeClr val="accent1"/>
-          </a:effectRef>
-          <a:fontRef idx="minor">
-            <a:schemeClr val="lt1"/>
-          </a:fontRef>
-        </p:style>
-        <p:txBody>
-          <a:bodyPr rtlCol="0" anchor="ctr"/>
-          <a:lstStyle/>
-          <a:p>
-            <a:pPr algn="ctr"/>
-            <a:endParaRPr lang="en-GB"/>
-          </a:p>
-        </p:txBody>
-      </p:sp>
-      <p:pic>
-        <p:nvPicPr>
-          <p:cNvPr id="14" name="Graphic 13">
-            <a:extLst>
-              <a:ext uri="{FF2B5EF4-FFF2-40B4-BE49-F238E27FC236}">
-                <a16:creationId xmlns:a16="http://schemas.microsoft.com/office/drawing/2014/main" id="{0A366DF0-2186-87DD-821E-5CCCB1B3E988}"/>
-              </a:ext>
-            </a:extLst>
-          </p:cNvPr>
-          <p:cNvPicPr>
-            <a:picLocks noChangeAspect="1"/>
-          </p:cNvPicPr>
-          <p:nvPr/>
-        </p:nvPicPr>
-        <p:blipFill>
-          <a:blip r:embed="rId2">
-            <a:extLst>
-              <a:ext uri="{28A0092B-C50C-407E-A947-70E740481C1C}">
-                <a14:useLocalDpi xmlns:a14="http://schemas.microsoft.com/office/drawing/2010/main" val="0"/>
-              </a:ext>
-              <a:ext uri="{96DAC541-7B7A-43D3-8B79-37D633B846F1}">
-                <asvg:svgBlip xmlns:asvg="http://schemas.microsoft.com/office/drawing/2016/SVG/main" r:embed="rId3"/>
-              </a:ext>
-            </a:extLst>
-          </a:blip>
-          <a:stretch>
-            <a:fillRect/>
-          </a:stretch>
-        </p:blipFill>
-        <p:spPr>
-          <a:xfrm>
-            <a:off x="11419250" y="203307"/>
-            <a:ext cx="426823" cy="622742"/>
-          </a:xfrm>
-          <a:prstGeom prst="rect">
-            <a:avLst/>
-          </a:prstGeom>
-        </p:spPr>
-      </p:pic>
-    </p:spTree>
-    <p:extLst>
-      <p:ext uri="{BB962C8B-B14F-4D97-AF65-F5344CB8AC3E}">
-        <p14:creationId xmlns:p14="http://schemas.microsoft.com/office/powerpoint/2010/main" val="1632882156"/>
-      </p:ext>
-    </p:extLst>
-  </p:cSld>
-  <p:clrMapOvr>
-    <a:masterClrMapping/>
-  </p:clrMapOvr>
-</p:sldLayout>
-</file>
-
-<file path=ppt/slideLayouts/slideLayout13.xml><?xml version="1.0" encoding="utf-8"?>
-<p:sldLayout xmlns:a="http://schemas.openxmlformats.org/drawingml/2006/main" xmlns:r="http://schemas.openxmlformats.org/officeDocument/2006/relationships" xmlns:p="http://schemas.openxmlformats.org/presentationml/2006/main" preserve="1">
-  <p:cSld name="Title Only">
-    <p:spTree>
-      <p:nvGrpSpPr>
-        <p:cNvPr id="1" name=""/>
-        <p:cNvGrpSpPr/>
-        <p:nvPr/>
-      </p:nvGrpSpPr>
-      <p:grpSpPr>
-        <a:xfrm>
-          <a:off x="0" y="0"/>
-          <a:ext cx="0" cy="0"/>
-          <a:chOff x="0" y="0"/>
-          <a:chExt cx="0" cy="0"/>
-        </a:xfrm>
-      </p:grpSpPr>
-      <p:sp>
-        <p:nvSpPr>
-          <p:cNvPr id="7" name="Rectangle 6">
-            <a:extLst>
-              <a:ext uri="{FF2B5EF4-FFF2-40B4-BE49-F238E27FC236}">
-                <a16:creationId xmlns:a16="http://schemas.microsoft.com/office/drawing/2014/main" id="{D7F0D94F-0C93-4252-B6F2-450FFCA7F2AB}"/>
-              </a:ext>
-            </a:extLst>
-          </p:cNvPr>
-          <p:cNvSpPr/>
-          <p:nvPr/>
-        </p:nvSpPr>
-        <p:spPr>
-          <a:xfrm>
-            <a:off x="0" y="101176"/>
-            <a:ext cx="12191999" cy="827008"/>
-          </a:xfrm>
-          <a:prstGeom prst="rect">
-            <a:avLst/>
-          </a:prstGeom>
-          <a:solidFill>
-            <a:srgbClr val="245391"/>
-          </a:solidFill>
-          <a:ln>
-            <a:noFill/>
-          </a:ln>
-        </p:spPr>
-        <p:style>
-          <a:lnRef idx="2">
-            <a:schemeClr val="accent1">
-              <a:shade val="50000"/>
-            </a:schemeClr>
-          </a:lnRef>
-          <a:fillRef idx="1">
-            <a:schemeClr val="accent1"/>
-          </a:fillRef>
-          <a:effectRef idx="0">
-            <a:schemeClr val="accent1"/>
-          </a:effectRef>
-          <a:fontRef idx="minor">
-            <a:schemeClr val="lt1"/>
-          </a:fontRef>
-        </p:style>
-        <p:txBody>
-          <a:bodyPr rtlCol="0" anchor="ctr"/>
-          <a:lstStyle/>
-          <a:p>
-            <a:pPr algn="ctr"/>
-            <a:endParaRPr lang="en-GB"/>
-          </a:p>
-        </p:txBody>
-      </p:sp>
-      <p:sp>
-        <p:nvSpPr>
-          <p:cNvPr id="8" name="Title 1">
-            <a:extLst>
-              <a:ext uri="{FF2B5EF4-FFF2-40B4-BE49-F238E27FC236}">
-                <a16:creationId xmlns:a16="http://schemas.microsoft.com/office/drawing/2014/main" id="{6894B5F9-3C75-6DB4-A85D-1EED77E88629}"/>
-              </a:ext>
-            </a:extLst>
-          </p:cNvPr>
-          <p:cNvSpPr>
-            <a:spLocks noGrp="1"/>
-          </p:cNvSpPr>
-          <p:nvPr>
-            <p:ph type="title"/>
-          </p:nvPr>
-        </p:nvSpPr>
-        <p:spPr>
-          <a:xfrm>
-            <a:off x="326590" y="101175"/>
-            <a:ext cx="10881880" cy="827009"/>
-          </a:xfrm>
-          <a:prstGeom prst="rect">
-            <a:avLst/>
-          </a:prstGeom>
-          <a:solidFill>
-            <a:srgbClr val="245391"/>
-          </a:solidFill>
-        </p:spPr>
-        <p:txBody>
-          <a:bodyPr>
-            <a:normAutofit/>
-          </a:bodyPr>
-          <a:lstStyle>
-            <a:lvl1pPr marL="0" indent="0">
-              <a:defRPr sz="3200" b="1">
-                <a:solidFill>
-                  <a:schemeClr val="bg1"/>
-                </a:solidFill>
-              </a:defRPr>
-            </a:lvl1pPr>
-          </a:lstStyle>
-          <a:p>
-            <a:r>
-              <a:rPr lang="en-US"/>
-              <a:t>Click to edit Master title style</a:t>
-            </a:r>
-            <a:endParaRPr lang="en-GB" dirty="0"/>
-          </a:p>
-        </p:txBody>
-      </p:sp>
-      <p:sp>
-        <p:nvSpPr>
-          <p:cNvPr id="9" name="Slide Number Placeholder 5">
-            <a:extLst>
-              <a:ext uri="{FF2B5EF4-FFF2-40B4-BE49-F238E27FC236}">
-                <a16:creationId xmlns:a16="http://schemas.microsoft.com/office/drawing/2014/main" id="{D40D9E9B-695B-7E25-3359-992FB8379BE0}"/>
-              </a:ext>
-            </a:extLst>
-          </p:cNvPr>
-          <p:cNvSpPr>
-            <a:spLocks noGrp="1"/>
-          </p:cNvSpPr>
-          <p:nvPr>
-            <p:ph type="sldNum" sz="quarter" idx="4"/>
-          </p:nvPr>
-        </p:nvSpPr>
-        <p:spPr>
-          <a:xfrm>
-            <a:off x="11484634" y="6650966"/>
-            <a:ext cx="370936" cy="207034"/>
-          </a:xfrm>
-          <a:prstGeom prst="rect">
-            <a:avLst/>
-          </a:prstGeom>
-        </p:spPr>
-        <p:txBody>
-          <a:bodyPr/>
-          <a:lstStyle>
-            <a:lvl1pPr algn="r">
-              <a:defRPr sz="1000">
-                <a:solidFill>
-                  <a:schemeClr val="bg1"/>
-                </a:solidFill>
-              </a:defRPr>
-            </a:lvl1pPr>
-          </a:lstStyle>
-          <a:p>
-            <a:fld id="{7767393B-85A6-40C1-AB65-A74DA355DB56}" type="slidenum">
-              <a:rPr lang="en-GB" smtClean="0"/>
-              <a:t>‹#›</a:t>
-            </a:fld>
-            <a:endParaRPr lang="en-GB"/>
-          </a:p>
-        </p:txBody>
-      </p:sp>
-      <p:sp>
-        <p:nvSpPr>
-          <p:cNvPr id="6" name="Parallelogram 5">
-            <a:extLst>
-              <a:ext uri="{FF2B5EF4-FFF2-40B4-BE49-F238E27FC236}">
-                <a16:creationId xmlns:a16="http://schemas.microsoft.com/office/drawing/2014/main" id="{4BC7397A-21FA-CFBE-6A60-B3893E122BA9}"/>
-              </a:ext>
-            </a:extLst>
-          </p:cNvPr>
-          <p:cNvSpPr/>
-          <p:nvPr/>
-        </p:nvSpPr>
-        <p:spPr>
-          <a:xfrm>
-            <a:off x="11208471" y="159685"/>
-            <a:ext cx="848382" cy="709988"/>
-          </a:xfrm>
-          <a:prstGeom prst="parallelogram">
-            <a:avLst/>
-          </a:prstGeom>
-          <a:solidFill>
-            <a:srgbClr val="F4DB52"/>
-          </a:solidFill>
-          <a:ln>
-            <a:noFill/>
-          </a:ln>
-        </p:spPr>
-        <p:style>
-          <a:lnRef idx="2">
-            <a:schemeClr val="accent1">
-              <a:shade val="50000"/>
-            </a:schemeClr>
-          </a:lnRef>
-          <a:fillRef idx="1">
-            <a:schemeClr val="accent1"/>
-          </a:fillRef>
-          <a:effectRef idx="0">
-            <a:schemeClr val="accent1"/>
-          </a:effectRef>
-          <a:fontRef idx="minor">
-            <a:schemeClr val="lt1"/>
-          </a:fontRef>
-        </p:style>
-        <p:txBody>
-          <a:bodyPr rtlCol="0" anchor="ctr"/>
-          <a:lstStyle/>
-          <a:p>
-            <a:pPr algn="ctr"/>
-            <a:endParaRPr lang="en-GB"/>
-          </a:p>
-        </p:txBody>
-      </p:sp>
-      <p:pic>
-        <p:nvPicPr>
-          <p:cNvPr id="10" name="Graphic 9">
-            <a:extLst>
-              <a:ext uri="{FF2B5EF4-FFF2-40B4-BE49-F238E27FC236}">
-                <a16:creationId xmlns:a16="http://schemas.microsoft.com/office/drawing/2014/main" id="{3D21CF32-8450-D230-EB83-65B126BC169E}"/>
-              </a:ext>
-            </a:extLst>
-          </p:cNvPr>
-          <p:cNvPicPr>
-            <a:picLocks noChangeAspect="1"/>
-          </p:cNvPicPr>
-          <p:nvPr/>
-        </p:nvPicPr>
-        <p:blipFill>
-          <a:blip r:embed="rId2">
-            <a:extLst>
-              <a:ext uri="{28A0092B-C50C-407E-A947-70E740481C1C}">
-                <a14:useLocalDpi xmlns:a14="http://schemas.microsoft.com/office/drawing/2010/main" val="0"/>
-              </a:ext>
-              <a:ext uri="{96DAC541-7B7A-43D3-8B79-37D633B846F1}">
-                <asvg:svgBlip xmlns:asvg="http://schemas.microsoft.com/office/drawing/2016/SVG/main" r:embed="rId3"/>
-              </a:ext>
-            </a:extLst>
-          </a:blip>
-          <a:stretch>
-            <a:fillRect/>
-          </a:stretch>
-        </p:blipFill>
-        <p:spPr>
-          <a:xfrm>
-            <a:off x="11419250" y="203307"/>
-            <a:ext cx="426823" cy="622742"/>
-          </a:xfrm>
-          <a:prstGeom prst="rect">
-            <a:avLst/>
-          </a:prstGeom>
-        </p:spPr>
-      </p:pic>
-    </p:spTree>
-    <p:extLst>
-      <p:ext uri="{BB962C8B-B14F-4D97-AF65-F5344CB8AC3E}">
-        <p14:creationId xmlns:p14="http://schemas.microsoft.com/office/powerpoint/2010/main" val="315990423"/>
-      </p:ext>
-    </p:extLst>
-  </p:cSld>
-  <p:clrMapOvr>
-    <a:masterClrMapping/>
-  </p:clrMapOvr>
-</p:sldLayout>
-</file>
-
-<file path=ppt/slideLayouts/slideLayout14.xml><?xml version="1.0" encoding="utf-8"?>
-<p:sldLayout xmlns:a="http://schemas.openxmlformats.org/drawingml/2006/main" xmlns:r="http://schemas.openxmlformats.org/officeDocument/2006/relationships" xmlns:p="http://schemas.openxmlformats.org/presentationml/2006/main" type="blank" preserve="1">
-  <p:cSld name="Blank">
-    <p:spTree>
-      <p:nvGrpSpPr>
-        <p:cNvPr id="1" name=""/>
-        <p:cNvGrpSpPr/>
-        <p:nvPr/>
-      </p:nvGrpSpPr>
-      <p:grpSpPr>
-        <a:xfrm>
-          <a:off x="0" y="0"/>
-          <a:ext cx="0" cy="0"/>
-          <a:chOff x="0" y="0"/>
-          <a:chExt cx="0" cy="0"/>
-        </a:xfrm>
-      </p:grpSpPr>
-      <p:sp>
-        <p:nvSpPr>
-          <p:cNvPr id="6" name="Slide Number Placeholder 5">
-            <a:extLst>
-              <a:ext uri="{FF2B5EF4-FFF2-40B4-BE49-F238E27FC236}">
-                <a16:creationId xmlns:a16="http://schemas.microsoft.com/office/drawing/2014/main" id="{D69C960F-029C-289D-38D6-CF5F60CDEE1C}"/>
-              </a:ext>
-            </a:extLst>
-          </p:cNvPr>
-          <p:cNvSpPr>
-            <a:spLocks noGrp="1"/>
-          </p:cNvSpPr>
-          <p:nvPr>
-            <p:ph type="sldNum" sz="quarter" idx="4"/>
-          </p:nvPr>
-        </p:nvSpPr>
-        <p:spPr>
-          <a:xfrm>
-            <a:off x="11484634" y="6650966"/>
-            <a:ext cx="370936" cy="207034"/>
-          </a:xfrm>
-          <a:prstGeom prst="rect">
-            <a:avLst/>
-          </a:prstGeom>
-        </p:spPr>
-        <p:txBody>
-          <a:bodyPr/>
-          <a:lstStyle>
-            <a:lvl1pPr algn="r">
-              <a:defRPr sz="1000">
-                <a:solidFill>
-                  <a:schemeClr val="bg1"/>
-                </a:solidFill>
-              </a:defRPr>
-            </a:lvl1pPr>
-          </a:lstStyle>
-          <a:p>
-            <a:fld id="{7767393B-85A6-40C1-AB65-A74DA355DB56}" type="slidenum">
-              <a:rPr lang="en-GB" smtClean="0"/>
-              <a:t>‹#›</a:t>
-            </a:fld>
-            <a:endParaRPr lang="en-GB"/>
-          </a:p>
-        </p:txBody>
-      </p:sp>
-      <p:sp>
-        <p:nvSpPr>
-          <p:cNvPr id="4" name="Parallelogram 3">
-            <a:extLst>
-              <a:ext uri="{FF2B5EF4-FFF2-40B4-BE49-F238E27FC236}">
-                <a16:creationId xmlns:a16="http://schemas.microsoft.com/office/drawing/2014/main" id="{1AE01DBA-F45B-E26C-6B7B-5DDD82F4AC45}"/>
-              </a:ext>
-            </a:extLst>
-          </p:cNvPr>
-          <p:cNvSpPr/>
-          <p:nvPr/>
-        </p:nvSpPr>
-        <p:spPr>
-          <a:xfrm>
-            <a:off x="11208471" y="159685"/>
-            <a:ext cx="848382" cy="709988"/>
-          </a:xfrm>
-          <a:prstGeom prst="parallelogram">
-            <a:avLst/>
-          </a:prstGeom>
-          <a:solidFill>
-            <a:srgbClr val="F4DB52"/>
-          </a:solidFill>
-          <a:ln>
-            <a:noFill/>
-          </a:ln>
-        </p:spPr>
-        <p:style>
-          <a:lnRef idx="2">
-            <a:schemeClr val="accent1">
-              <a:shade val="50000"/>
-            </a:schemeClr>
-          </a:lnRef>
-          <a:fillRef idx="1">
-            <a:schemeClr val="accent1"/>
-          </a:fillRef>
-          <a:effectRef idx="0">
-            <a:schemeClr val="accent1"/>
-          </a:effectRef>
-          <a:fontRef idx="minor">
-            <a:schemeClr val="lt1"/>
-          </a:fontRef>
-        </p:style>
-        <p:txBody>
-          <a:bodyPr rtlCol="0" anchor="ctr"/>
-          <a:lstStyle/>
-          <a:p>
-            <a:pPr algn="ctr"/>
-            <a:endParaRPr lang="en-GB"/>
-          </a:p>
-        </p:txBody>
-      </p:sp>
       <p:pic>
         <p:nvPicPr>
           <p:cNvPr id="5" name="Graphic 4">
@@ -2614,7 +752,7 @@
 </p:sldLayout>
 </file>
 
-<file path=ppt/slideLayouts/slideLayout15.xml><?xml version="1.0" encoding="utf-8"?>
+<file path=ppt/slideLayouts/slideLayout11.xml><?xml version="1.0" encoding="utf-8"?>
 <p:sldLayout xmlns:a="http://schemas.openxmlformats.org/drawingml/2006/main" xmlns:r="http://schemas.openxmlformats.org/officeDocument/2006/relationships" xmlns:p="http://schemas.openxmlformats.org/presentationml/2006/main" preserve="1">
   <p:cSld name="Content with Caption">
     <p:spTree>
@@ -3063,7 +1201,7 @@
 </p:sldLayout>
 </file>
 
-<file path=ppt/slideLayouts/slideLayout16.xml><?xml version="1.0" encoding="utf-8"?>
+<file path=ppt/slideLayouts/slideLayout12.xml><?xml version="1.0" encoding="utf-8"?>
 <p:sldLayout xmlns:a="http://schemas.openxmlformats.org/drawingml/2006/main" xmlns:r="http://schemas.openxmlformats.org/officeDocument/2006/relationships" xmlns:p="http://schemas.openxmlformats.org/presentationml/2006/main" preserve="1">
   <p:cSld name="Picture with Caption">
     <p:spTree>
@@ -4040,7 +2178,7 @@
         <p:spPr>
           <a:xfrm>
             <a:off x="0" y="101176"/>
-            <a:ext cx="12191999" cy="827008"/>
+            <a:ext cx="12191999" cy="626793"/>
           </a:xfrm>
           <a:prstGeom prst="rect">
             <a:avLst/>
@@ -4096,7 +2234,7 @@
         <p:spPr>
           <a:xfrm>
             <a:off x="177800" y="101175"/>
-            <a:ext cx="11836400" cy="827009"/>
+            <a:ext cx="11836400" cy="626793"/>
           </a:xfrm>
           <a:prstGeom prst="rect">
             <a:avLst/>
@@ -4120,7 +2258,7 @@
           </a:lstStyle>
           <a:p>
             <a:r>
-              <a:rPr lang="en-US"/>
+              <a:rPr lang="en-US" dirty="0"/>
               <a:t>Click to edit Master title style</a:t>
             </a:r>
             <a:endParaRPr lang="en-GB" dirty="0"/>
@@ -4145,8 +2283,8 @@
         </p:nvSpPr>
         <p:spPr>
           <a:xfrm>
-            <a:off x="177800" y="1036320"/>
-            <a:ext cx="11836400" cy="5392760"/>
+            <a:off x="177800" y="807868"/>
+            <a:ext cx="11836400" cy="5621212"/>
           </a:xfrm>
           <a:prstGeom prst="rect">
             <a:avLst/>
@@ -4268,7 +2406,7 @@
 </file>
 
 <file path=ppt/slideLayouts/slideLayout5.xml><?xml version="1.0" encoding="utf-8"?>
-<p:sldLayout xmlns:a="http://schemas.openxmlformats.org/drawingml/2006/main" xmlns:r="http://schemas.openxmlformats.org/officeDocument/2006/relationships" xmlns:p="http://schemas.openxmlformats.org/presentationml/2006/main" preserve="1">
+<p:sldLayout xmlns:a="http://schemas.openxmlformats.org/drawingml/2006/main" xmlns:r="http://schemas.openxmlformats.org/officeDocument/2006/relationships" xmlns:p="http://schemas.openxmlformats.org/presentationml/2006/main" preserve="1" userDrawn="1">
   <p:cSld name="Two Content - No Colour">
     <p:spTree>
       <p:nvGrpSpPr>
@@ -4302,8 +2440,8 @@
         </p:nvSpPr>
         <p:spPr>
           <a:xfrm>
-            <a:off x="326590" y="1150070"/>
-            <a:ext cx="5693210" cy="5279010"/>
+            <a:off x="177800" y="861134"/>
+            <a:ext cx="5842000" cy="5567946"/>
           </a:xfrm>
           <a:prstGeom prst="rect">
             <a:avLst/>
@@ -4368,8 +2506,8 @@
         </p:nvSpPr>
         <p:spPr>
           <a:xfrm>
-            <a:off x="6172202" y="1150070"/>
-            <a:ext cx="5683368" cy="5279010"/>
+            <a:off x="6172202" y="861134"/>
+            <a:ext cx="5841998" cy="5567946"/>
           </a:xfrm>
           <a:prstGeom prst="rect">
             <a:avLst/>
@@ -4418,20 +2556,66 @@
       </p:sp>
       <p:sp>
         <p:nvSpPr>
-          <p:cNvPr id="9" name="Rectangle 8">
-            <a:extLst>
-              <a:ext uri="{FF2B5EF4-FFF2-40B4-BE49-F238E27FC236}">
-                <a16:creationId xmlns:a16="http://schemas.microsoft.com/office/drawing/2014/main" id="{43E97568-94FD-F797-00D0-A204C8758D41}"/>
+          <p:cNvPr id="12" name="Slide Number Placeholder 5">
+            <a:extLst>
+              <a:ext uri="{FF2B5EF4-FFF2-40B4-BE49-F238E27FC236}">
+                <a16:creationId xmlns:a16="http://schemas.microsoft.com/office/drawing/2014/main" id="{26D26384-FFA6-46A5-CD52-9800186C7F07}"/>
+              </a:ext>
+            </a:extLst>
+          </p:cNvPr>
+          <p:cNvSpPr>
+            <a:spLocks noGrp="1"/>
+          </p:cNvSpPr>
+          <p:nvPr>
+            <p:ph type="sldNum" sz="quarter" idx="4"/>
+          </p:nvPr>
+        </p:nvSpPr>
+        <p:spPr>
+          <a:xfrm>
+            <a:off x="11484634" y="6650966"/>
+            <a:ext cx="370936" cy="207034"/>
+          </a:xfrm>
+          <a:prstGeom prst="rect">
+            <a:avLst/>
+          </a:prstGeom>
+        </p:spPr>
+        <p:txBody>
+          <a:bodyPr/>
+          <a:lstStyle>
+            <a:lvl1pPr algn="r">
+              <a:defRPr sz="1000">
+                <a:solidFill>
+                  <a:schemeClr val="bg1"/>
+                </a:solidFill>
+              </a:defRPr>
+            </a:lvl1pPr>
+          </a:lstStyle>
+          <a:p>
+            <a:fld id="{7767393B-85A6-40C1-AB65-A74DA355DB56}" type="slidenum">
+              <a:rPr lang="en-GB" smtClean="0"/>
+              <a:pPr/>
+              <a:t>‹#›</a:t>
+            </a:fld>
+            <a:endParaRPr lang="en-GB"/>
+          </a:p>
+        </p:txBody>
+      </p:sp>
+      <p:sp>
+        <p:nvSpPr>
+          <p:cNvPr id="2" name="Rectangle 1">
+            <a:extLst>
+              <a:ext uri="{FF2B5EF4-FFF2-40B4-BE49-F238E27FC236}">
+                <a16:creationId xmlns:a16="http://schemas.microsoft.com/office/drawing/2014/main" id="{3F0FBB52-E34C-3A2C-692A-1FE7035E6660}"/>
               </a:ext>
             </a:extLst>
           </p:cNvPr>
           <p:cNvSpPr/>
-          <p:nvPr/>
+          <p:nvPr userDrawn="1"/>
         </p:nvSpPr>
         <p:spPr>
           <a:xfrm>
             <a:off x="0" y="101176"/>
-            <a:ext cx="12191999" cy="827008"/>
+            <a:ext cx="12191999" cy="626793"/>
           </a:xfrm>
           <a:prstGeom prst="rect">
             <a:avLst/>
@@ -4470,10 +2654,10 @@
       </p:sp>
       <p:sp>
         <p:nvSpPr>
-          <p:cNvPr id="10" name="Title 1">
-            <a:extLst>
-              <a:ext uri="{FF2B5EF4-FFF2-40B4-BE49-F238E27FC236}">
-                <a16:creationId xmlns:a16="http://schemas.microsoft.com/office/drawing/2014/main" id="{D9F72F79-6B14-C5F0-EDC1-E3E0F8BCA436}"/>
+          <p:cNvPr id="5" name="Title 1">
+            <a:extLst>
+              <a:ext uri="{FF2B5EF4-FFF2-40B4-BE49-F238E27FC236}">
+                <a16:creationId xmlns:a16="http://schemas.microsoft.com/office/drawing/2014/main" id="{5E4093B2-6165-CFB3-0310-31737C373CEF}"/>
               </a:ext>
             </a:extLst>
           </p:cNvPr>
@@ -4486,8 +2670,8 @@
         </p:nvSpPr>
         <p:spPr>
           <a:xfrm>
-            <a:off x="326590" y="101175"/>
-            <a:ext cx="10881880" cy="827009"/>
+            <a:off x="177800" y="101175"/>
+            <a:ext cx="11836400" cy="626793"/>
           </a:xfrm>
           <a:prstGeom prst="rect">
             <a:avLst/>
@@ -4511,8 +2695,176 @@
           </a:lstStyle>
           <a:p>
             <a:r>
+              <a:rPr lang="en-US" dirty="0"/>
+              <a:t>Click to edit Master title style</a:t>
+            </a:r>
+            <a:endParaRPr lang="en-GB" dirty="0"/>
+          </a:p>
+        </p:txBody>
+      </p:sp>
+    </p:spTree>
+    <p:extLst>
+      <p:ext uri="{BB962C8B-B14F-4D97-AF65-F5344CB8AC3E}">
+        <p14:creationId xmlns:p14="http://schemas.microsoft.com/office/powerpoint/2010/main" val="2481587099"/>
+      </p:ext>
+    </p:extLst>
+  </p:cSld>
+  <p:clrMapOvr>
+    <a:masterClrMapping/>
+  </p:clrMapOvr>
+</p:sldLayout>
+</file>
+
+<file path=ppt/slideLayouts/slideLayout6.xml><?xml version="1.0" encoding="utf-8"?>
+<p:sldLayout xmlns:a="http://schemas.openxmlformats.org/drawingml/2006/main" xmlns:r="http://schemas.openxmlformats.org/officeDocument/2006/relationships" xmlns:p="http://schemas.openxmlformats.org/presentationml/2006/main" preserve="1" userDrawn="1">
+  <p:cSld name="Two Content - Yellow Green">
+    <p:spTree>
+      <p:nvGrpSpPr>
+        <p:cNvPr id="1" name=""/>
+        <p:cNvGrpSpPr/>
+        <p:nvPr/>
+      </p:nvGrpSpPr>
+      <p:grpSpPr>
+        <a:xfrm>
+          <a:off x="0" y="0"/>
+          <a:ext cx="0" cy="0"/>
+          <a:chOff x="0" y="0"/>
+          <a:chExt cx="0" cy="0"/>
+        </a:xfrm>
+      </p:grpSpPr>
+      <p:sp>
+        <p:nvSpPr>
+          <p:cNvPr id="3" name="Content Placeholder 2">
+            <a:extLst>
+              <a:ext uri="{FF2B5EF4-FFF2-40B4-BE49-F238E27FC236}">
+                <a16:creationId xmlns:a16="http://schemas.microsoft.com/office/drawing/2014/main" id="{FFB3E276-45A6-3182-E191-0D21CECBD5BF}"/>
+              </a:ext>
+            </a:extLst>
+          </p:cNvPr>
+          <p:cNvSpPr>
+            <a:spLocks noGrp="1"/>
+          </p:cNvSpPr>
+          <p:nvPr>
+            <p:ph sz="half" idx="1"/>
+          </p:nvPr>
+        </p:nvSpPr>
+        <p:spPr>
+          <a:xfrm>
+            <a:off x="177800" y="861134"/>
+            <a:ext cx="5842000" cy="5567946"/>
+          </a:xfrm>
+          <a:prstGeom prst="rect">
+            <a:avLst/>
+          </a:prstGeom>
+          <a:solidFill>
+            <a:srgbClr val="F8E992"/>
+          </a:solidFill>
+        </p:spPr>
+        <p:txBody>
+          <a:bodyPr/>
+          <a:lstStyle/>
+          <a:p>
+            <a:pPr lvl="0"/>
+            <a:r>
               <a:rPr lang="en-US"/>
-              <a:t>Click to edit Master title style</a:t>
+              <a:t>Click to edit Master text styles</a:t>
+            </a:r>
+          </a:p>
+          <a:p>
+            <a:pPr lvl="1"/>
+            <a:r>
+              <a:rPr lang="en-US"/>
+              <a:t>Second level</a:t>
+            </a:r>
+          </a:p>
+          <a:p>
+            <a:pPr lvl="2"/>
+            <a:r>
+              <a:rPr lang="en-US"/>
+              <a:t>Third level</a:t>
+            </a:r>
+          </a:p>
+          <a:p>
+            <a:pPr lvl="3"/>
+            <a:r>
+              <a:rPr lang="en-US"/>
+              <a:t>Fourth level</a:t>
+            </a:r>
+          </a:p>
+          <a:p>
+            <a:pPr lvl="4"/>
+            <a:r>
+              <a:rPr lang="en-US"/>
+              <a:t>Fifth level</a:t>
+            </a:r>
+            <a:endParaRPr lang="en-GB" dirty="0"/>
+          </a:p>
+        </p:txBody>
+      </p:sp>
+      <p:sp>
+        <p:nvSpPr>
+          <p:cNvPr id="4" name="Content Placeholder 3">
+            <a:extLst>
+              <a:ext uri="{FF2B5EF4-FFF2-40B4-BE49-F238E27FC236}">
+                <a16:creationId xmlns:a16="http://schemas.microsoft.com/office/drawing/2014/main" id="{24DAC9F3-A161-D5C8-4EB3-26AE99A810B4}"/>
+              </a:ext>
+            </a:extLst>
+          </p:cNvPr>
+          <p:cNvSpPr>
+            <a:spLocks noGrp="1"/>
+          </p:cNvSpPr>
+          <p:nvPr>
+            <p:ph sz="half" idx="2"/>
+          </p:nvPr>
+        </p:nvSpPr>
+        <p:spPr>
+          <a:xfrm>
+            <a:off x="6172202" y="861134"/>
+            <a:ext cx="5841998" cy="5567946"/>
+          </a:xfrm>
+          <a:prstGeom prst="rect">
+            <a:avLst/>
+          </a:prstGeom>
+          <a:solidFill>
+            <a:srgbClr val="90D098"/>
+          </a:solidFill>
+        </p:spPr>
+        <p:txBody>
+          <a:bodyPr/>
+          <a:lstStyle/>
+          <a:p>
+            <a:pPr lvl="0"/>
+            <a:r>
+              <a:rPr lang="en-US" dirty="0"/>
+              <a:t>Click to edit Master text styles</a:t>
+            </a:r>
+          </a:p>
+          <a:p>
+            <a:pPr lvl="1"/>
+            <a:r>
+              <a:rPr lang="en-US" dirty="0"/>
+              <a:t>Second level</a:t>
+            </a:r>
+          </a:p>
+          <a:p>
+            <a:pPr lvl="2"/>
+            <a:r>
+              <a:rPr lang="en-US" dirty="0"/>
+              <a:t>Third level</a:t>
+            </a:r>
+          </a:p>
+          <a:p>
+            <a:pPr lvl="3"/>
+            <a:r>
+              <a:rPr lang="en-US" dirty="0"/>
+              <a:t>Fourth level</a:t>
+            </a:r>
+          </a:p>
+          <a:p>
+            <a:pPr lvl="4"/>
+            <a:r>
+              <a:rPr lang="en-US" dirty="0"/>
+              <a:t>Fifth level</a:t>
             </a:r>
             <a:endParaRPr lang="en-GB" dirty="0"/>
           </a:p>
@@ -4566,26 +2918,26 @@
       </p:sp>
       <p:sp>
         <p:nvSpPr>
-          <p:cNvPr id="8" name="Parallelogram 7">
-            <a:extLst>
-              <a:ext uri="{FF2B5EF4-FFF2-40B4-BE49-F238E27FC236}">
-                <a16:creationId xmlns:a16="http://schemas.microsoft.com/office/drawing/2014/main" id="{E2C3CC97-F1D4-E0B5-5B7A-20E7171E894D}"/>
+          <p:cNvPr id="2" name="Rectangle 1">
+            <a:extLst>
+              <a:ext uri="{FF2B5EF4-FFF2-40B4-BE49-F238E27FC236}">
+                <a16:creationId xmlns:a16="http://schemas.microsoft.com/office/drawing/2014/main" id="{6EC2F1DB-5A59-9ED0-5551-95010F872981}"/>
               </a:ext>
             </a:extLst>
           </p:cNvPr>
           <p:cNvSpPr/>
-          <p:nvPr/>
-        </p:nvSpPr>
-        <p:spPr>
-          <a:xfrm>
-            <a:off x="11208471" y="159685"/>
-            <a:ext cx="848382" cy="709988"/>
-          </a:xfrm>
-          <a:prstGeom prst="parallelogram">
-            <a:avLst/>
-          </a:prstGeom>
-          <a:solidFill>
-            <a:srgbClr val="F4DB52"/>
+          <p:nvPr userDrawn="1"/>
+        </p:nvSpPr>
+        <p:spPr>
+          <a:xfrm>
+            <a:off x="0" y="101176"/>
+            <a:ext cx="12191999" cy="626793"/>
+          </a:xfrm>
+          <a:prstGeom prst="rect">
+            <a:avLst/>
+          </a:prstGeom>
+          <a:solidFill>
+            <a:srgbClr val="245391"/>
           </a:solidFill>
           <a:ln>
             <a:noFill/>
@@ -4616,49 +2968,60 @@
           </a:p>
         </p:txBody>
       </p:sp>
-      <p:pic>
-        <p:nvPicPr>
-          <p:cNvPr id="11" name="Graphic 10">
-            <a:extLst>
-              <a:ext uri="{FF2B5EF4-FFF2-40B4-BE49-F238E27FC236}">
-                <a16:creationId xmlns:a16="http://schemas.microsoft.com/office/drawing/2014/main" id="{1A442065-41AB-9901-8048-5F26D07CC2E0}"/>
-              </a:ext>
-            </a:extLst>
-          </p:cNvPr>
-          <p:cNvPicPr>
-            <a:picLocks noChangeAspect="1"/>
-          </p:cNvPicPr>
-          <p:nvPr/>
-        </p:nvPicPr>
-        <p:blipFill>
-          <a:blip r:embed="rId2">
-            <a:extLst>
-              <a:ext uri="{28A0092B-C50C-407E-A947-70E740481C1C}">
-                <a14:useLocalDpi xmlns:a14="http://schemas.microsoft.com/office/drawing/2010/main" val="0"/>
-              </a:ext>
-              <a:ext uri="{96DAC541-7B7A-43D3-8B79-37D633B846F1}">
-                <asvg:svgBlip xmlns:asvg="http://schemas.microsoft.com/office/drawing/2016/SVG/main" r:embed="rId3"/>
-              </a:ext>
-            </a:extLst>
-          </a:blip>
-          <a:stretch>
-            <a:fillRect/>
-          </a:stretch>
-        </p:blipFill>
-        <p:spPr>
-          <a:xfrm>
-            <a:off x="11419250" y="203307"/>
-            <a:ext cx="426823" cy="622742"/>
-          </a:xfrm>
-          <a:prstGeom prst="rect">
-            <a:avLst/>
-          </a:prstGeom>
-        </p:spPr>
-      </p:pic>
+      <p:sp>
+        <p:nvSpPr>
+          <p:cNvPr id="5" name="Title 1">
+            <a:extLst>
+              <a:ext uri="{FF2B5EF4-FFF2-40B4-BE49-F238E27FC236}">
+                <a16:creationId xmlns:a16="http://schemas.microsoft.com/office/drawing/2014/main" id="{E1712F8D-66DC-0A69-E5B1-D860652125A8}"/>
+              </a:ext>
+            </a:extLst>
+          </p:cNvPr>
+          <p:cNvSpPr>
+            <a:spLocks noGrp="1"/>
+          </p:cNvSpPr>
+          <p:nvPr>
+            <p:ph type="title"/>
+          </p:nvPr>
+        </p:nvSpPr>
+        <p:spPr>
+          <a:xfrm>
+            <a:off x="177800" y="101175"/>
+            <a:ext cx="11836400" cy="626793"/>
+          </a:xfrm>
+          <a:prstGeom prst="rect">
+            <a:avLst/>
+          </a:prstGeom>
+          <a:solidFill>
+            <a:srgbClr val="245391"/>
+          </a:solidFill>
+        </p:spPr>
+        <p:txBody>
+          <a:bodyPr>
+            <a:normAutofit/>
+          </a:bodyPr>
+          <a:lstStyle>
+            <a:lvl1pPr marL="0" indent="0">
+              <a:defRPr sz="3200" b="1">
+                <a:solidFill>
+                  <a:schemeClr val="bg1"/>
+                </a:solidFill>
+              </a:defRPr>
+            </a:lvl1pPr>
+          </a:lstStyle>
+          <a:p>
+            <a:r>
+              <a:rPr lang="en-US" dirty="0"/>
+              <a:t>Click to edit Master title style</a:t>
+            </a:r>
+            <a:endParaRPr lang="en-GB" dirty="0"/>
+          </a:p>
+        </p:txBody>
+      </p:sp>
     </p:spTree>
     <p:extLst>
       <p:ext uri="{BB962C8B-B14F-4D97-AF65-F5344CB8AC3E}">
-        <p14:creationId xmlns:p14="http://schemas.microsoft.com/office/powerpoint/2010/main" val="2481587099"/>
+        <p14:creationId xmlns:p14="http://schemas.microsoft.com/office/powerpoint/2010/main" val="2738861046"/>
       </p:ext>
     </p:extLst>
   </p:cSld>
@@ -4668,9 +3031,9 @@
 </p:sldLayout>
 </file>
 
-<file path=ppt/slideLayouts/slideLayout6.xml><?xml version="1.0" encoding="utf-8"?>
-<p:sldLayout xmlns:a="http://schemas.openxmlformats.org/drawingml/2006/main" xmlns:r="http://schemas.openxmlformats.org/officeDocument/2006/relationships" xmlns:p="http://schemas.openxmlformats.org/presentationml/2006/main" preserve="1">
-  <p:cSld name="Two Content - Yellow Green">
+<file path=ppt/slideLayouts/slideLayout7.xml><?xml version="1.0" encoding="utf-8"?>
+<p:sldLayout xmlns:a="http://schemas.openxmlformats.org/drawingml/2006/main" xmlns:r="http://schemas.openxmlformats.org/officeDocument/2006/relationships" xmlns:p="http://schemas.openxmlformats.org/presentationml/2006/main" preserve="1" userDrawn="1">
+  <p:cSld name="Comparison - Light Blue Sub-Header">
     <p:spTree>
       <p:nvGrpSpPr>
         <p:cNvPr id="1" name=""/>
@@ -4687,10 +3050,10 @@
       </p:grpSpPr>
       <p:sp>
         <p:nvSpPr>
-          <p:cNvPr id="3" name="Content Placeholder 2">
-            <a:extLst>
-              <a:ext uri="{FF2B5EF4-FFF2-40B4-BE49-F238E27FC236}">
-                <a16:creationId xmlns:a16="http://schemas.microsoft.com/office/drawing/2014/main" id="{FFB3E276-45A6-3182-E191-0D21CECBD5BF}"/>
+          <p:cNvPr id="3" name="Text Placeholder 2">
+            <a:extLst>
+              <a:ext uri="{FF2B5EF4-FFF2-40B4-BE49-F238E27FC236}">
+                <a16:creationId xmlns:a16="http://schemas.microsoft.com/office/drawing/2014/main" id="{A7EE70C0-0004-DA5B-411C-22A2E3426F32}"/>
               </a:ext>
             </a:extLst>
           </p:cNvPr>
@@ -4698,60 +3061,72 @@
             <a:spLocks noGrp="1"/>
           </p:cNvSpPr>
           <p:nvPr>
-            <p:ph sz="half" idx="1"/>
+            <p:ph type="body" idx="1"/>
           </p:nvPr>
         </p:nvSpPr>
         <p:spPr>
           <a:xfrm>
-            <a:off x="326590" y="1150070"/>
-            <a:ext cx="5693210" cy="5279010"/>
-          </a:xfrm>
-          <a:prstGeom prst="rect">
-            <a:avLst/>
-          </a:prstGeom>
-          <a:solidFill>
-            <a:srgbClr val="F8E992"/>
-          </a:solidFill>
-        </p:spPr>
-        <p:txBody>
-          <a:bodyPr/>
-          <a:lstStyle/>
+            <a:off x="177800" y="820130"/>
+            <a:ext cx="5842000" cy="659877"/>
+          </a:xfrm>
+          <a:prstGeom prst="rect">
+            <a:avLst/>
+          </a:prstGeom>
+          <a:solidFill>
+            <a:srgbClr val="00A1D7"/>
+          </a:solidFill>
+        </p:spPr>
+        <p:txBody>
+          <a:bodyPr anchor="b"/>
+          <a:lstStyle>
+            <a:lvl1pPr marL="0" indent="0">
+              <a:buNone/>
+              <a:defRPr sz="2800" b="1">
+                <a:solidFill>
+                  <a:schemeClr val="bg1"/>
+                </a:solidFill>
+              </a:defRPr>
+            </a:lvl1pPr>
+            <a:lvl2pPr marL="457200" indent="0">
+              <a:buNone/>
+              <a:defRPr sz="2000" b="1"/>
+            </a:lvl2pPr>
+            <a:lvl3pPr marL="914400" indent="0">
+              <a:buNone/>
+              <a:defRPr sz="1800" b="1"/>
+            </a:lvl3pPr>
+            <a:lvl4pPr marL="1371600" indent="0">
+              <a:buNone/>
+              <a:defRPr sz="1600" b="1"/>
+            </a:lvl4pPr>
+            <a:lvl5pPr marL="1828800" indent="0">
+              <a:buNone/>
+              <a:defRPr sz="1600" b="1"/>
+            </a:lvl5pPr>
+            <a:lvl6pPr marL="2286000" indent="0">
+              <a:buNone/>
+              <a:defRPr sz="1600" b="1"/>
+            </a:lvl6pPr>
+            <a:lvl7pPr marL="2743200" indent="0">
+              <a:buNone/>
+              <a:defRPr sz="1600" b="1"/>
+            </a:lvl7pPr>
+            <a:lvl8pPr marL="3200400" indent="0">
+              <a:buNone/>
+              <a:defRPr sz="1600" b="1"/>
+            </a:lvl8pPr>
+            <a:lvl9pPr marL="3657600" indent="0">
+              <a:buNone/>
+              <a:defRPr sz="1600" b="1"/>
+            </a:lvl9pPr>
+          </a:lstStyle>
           <a:p>
             <a:pPr lvl="0"/>
             <a:r>
-              <a:rPr lang="en-US"/>
+              <a:rPr lang="en-US" dirty="0"/>
               <a:t>Click to edit Master text styles</a:t>
             </a:r>
           </a:p>
-          <a:p>
-            <a:pPr lvl="1"/>
-            <a:r>
-              <a:rPr lang="en-US"/>
-              <a:t>Second level</a:t>
-            </a:r>
-          </a:p>
-          <a:p>
-            <a:pPr lvl="2"/>
-            <a:r>
-              <a:rPr lang="en-US"/>
-              <a:t>Third level</a:t>
-            </a:r>
-          </a:p>
-          <a:p>
-            <a:pPr lvl="3"/>
-            <a:r>
-              <a:rPr lang="en-US"/>
-              <a:t>Fourth level</a:t>
-            </a:r>
-          </a:p>
-          <a:p>
-            <a:pPr lvl="4"/>
-            <a:r>
-              <a:rPr lang="en-US"/>
-              <a:t>Fifth level</a:t>
-            </a:r>
-            <a:endParaRPr lang="en-GB" dirty="0"/>
-          </a:p>
         </p:txBody>
       </p:sp>
       <p:sp>
@@ -4759,7 +3134,7 @@
           <p:cNvPr id="4" name="Content Placeholder 3">
             <a:extLst>
               <a:ext uri="{FF2B5EF4-FFF2-40B4-BE49-F238E27FC236}">
-                <a16:creationId xmlns:a16="http://schemas.microsoft.com/office/drawing/2014/main" id="{24DAC9F3-A161-D5C8-4EB3-26AE99A810B4}"/>
+                <a16:creationId xmlns:a16="http://schemas.microsoft.com/office/drawing/2014/main" id="{433E7C9F-2EEC-6475-AE93-1246752B2204}"/>
               </a:ext>
             </a:extLst>
           </p:cNvPr>
@@ -4772,15 +3147,12 @@
         </p:nvSpPr>
         <p:spPr>
           <a:xfrm>
-            <a:off x="6172202" y="1150070"/>
-            <a:ext cx="5683368" cy="5279010"/>
-          </a:xfrm>
-          <a:prstGeom prst="rect">
-            <a:avLst/>
-          </a:prstGeom>
-          <a:solidFill>
-            <a:srgbClr val="90D098"/>
-          </a:solidFill>
+            <a:off x="177800" y="1572168"/>
+            <a:ext cx="5842000" cy="4856912"/>
+          </a:xfrm>
+          <a:prstGeom prst="rect">
+            <a:avLst/>
+          </a:prstGeom>
         </p:spPr>
         <p:txBody>
           <a:bodyPr/>
@@ -4819,26 +3191,190 @@
               <a:rPr lang="en-US"/>
               <a:t>Fifth level</a:t>
             </a:r>
+            <a:endParaRPr lang="en-GB" dirty="0"/>
+          </a:p>
+        </p:txBody>
+      </p:sp>
+      <p:sp>
+        <p:nvSpPr>
+          <p:cNvPr id="5" name="Text Placeholder 4">
+            <a:extLst>
+              <a:ext uri="{FF2B5EF4-FFF2-40B4-BE49-F238E27FC236}">
+                <a16:creationId xmlns:a16="http://schemas.microsoft.com/office/drawing/2014/main" id="{6581B006-631F-4BB6-7AFB-4D358EC005E0}"/>
+              </a:ext>
+            </a:extLst>
+          </p:cNvPr>
+          <p:cNvSpPr>
+            <a:spLocks noGrp="1"/>
+          </p:cNvSpPr>
+          <p:nvPr>
+            <p:ph type="body" sz="quarter" idx="3"/>
+          </p:nvPr>
+        </p:nvSpPr>
+        <p:spPr>
+          <a:xfrm>
+            <a:off x="6172200" y="820130"/>
+            <a:ext cx="5832164" cy="659877"/>
+          </a:xfrm>
+          <a:prstGeom prst="rect">
+            <a:avLst/>
+          </a:prstGeom>
+          <a:solidFill>
+            <a:srgbClr val="00A1D7"/>
+          </a:solidFill>
+        </p:spPr>
+        <p:txBody>
+          <a:bodyPr vert="horz" lIns="91440" tIns="45720" rIns="91440" bIns="45720" rtlCol="0" anchor="b">
+            <a:normAutofit/>
+          </a:bodyPr>
+          <a:lstStyle>
+            <a:lvl1pPr>
+              <a:defRPr lang="en-US" b="1" dirty="0">
+                <a:solidFill>
+                  <a:schemeClr val="bg1"/>
+                </a:solidFill>
+              </a:defRPr>
+            </a:lvl1pPr>
+          </a:lstStyle>
+          <a:p>
+            <a:pPr marL="0" lvl="0" indent="0">
+              <a:buNone/>
+            </a:pPr>
+            <a:r>
+              <a:rPr lang="en-US"/>
+              <a:t>Click to edit Master text styles</a:t>
+            </a:r>
+          </a:p>
+        </p:txBody>
+      </p:sp>
+      <p:sp>
+        <p:nvSpPr>
+          <p:cNvPr id="6" name="Content Placeholder 5">
+            <a:extLst>
+              <a:ext uri="{FF2B5EF4-FFF2-40B4-BE49-F238E27FC236}">
+                <a16:creationId xmlns:a16="http://schemas.microsoft.com/office/drawing/2014/main" id="{4D14FAB4-C3D5-5802-AC62-3F1B0FEE0444}"/>
+              </a:ext>
+            </a:extLst>
+          </p:cNvPr>
+          <p:cNvSpPr>
+            <a:spLocks noGrp="1"/>
+          </p:cNvSpPr>
+          <p:nvPr>
+            <p:ph sz="quarter" idx="4"/>
+          </p:nvPr>
+        </p:nvSpPr>
+        <p:spPr>
+          <a:xfrm>
+            <a:off x="6172199" y="1572168"/>
+            <a:ext cx="5842000" cy="4856912"/>
+          </a:xfrm>
+          <a:prstGeom prst="rect">
+            <a:avLst/>
+          </a:prstGeom>
+        </p:spPr>
+        <p:txBody>
+          <a:bodyPr/>
+          <a:lstStyle/>
+          <a:p>
+            <a:pPr lvl="0"/>
+            <a:r>
+              <a:rPr lang="en-US"/>
+              <a:t>Click to edit Master text styles</a:t>
+            </a:r>
+          </a:p>
+          <a:p>
+            <a:pPr lvl="1"/>
+            <a:r>
+              <a:rPr lang="en-US"/>
+              <a:t>Second level</a:t>
+            </a:r>
+          </a:p>
+          <a:p>
+            <a:pPr lvl="2"/>
+            <a:r>
+              <a:rPr lang="en-US"/>
+              <a:t>Third level</a:t>
+            </a:r>
+          </a:p>
+          <a:p>
+            <a:pPr lvl="3"/>
+            <a:r>
+              <a:rPr lang="en-US"/>
+              <a:t>Fourth level</a:t>
+            </a:r>
+          </a:p>
+          <a:p>
+            <a:pPr lvl="4"/>
+            <a:r>
+              <a:rPr lang="en-US"/>
+              <a:t>Fifth level</a:t>
+            </a:r>
             <a:endParaRPr lang="en-GB"/>
           </a:p>
         </p:txBody>
       </p:sp>
       <p:sp>
         <p:nvSpPr>
-          <p:cNvPr id="9" name="Rectangle 8">
-            <a:extLst>
-              <a:ext uri="{FF2B5EF4-FFF2-40B4-BE49-F238E27FC236}">
-                <a16:creationId xmlns:a16="http://schemas.microsoft.com/office/drawing/2014/main" id="{43E97568-94FD-F797-00D0-A204C8758D41}"/>
+          <p:cNvPr id="13" name="Slide Number Placeholder 5">
+            <a:extLst>
+              <a:ext uri="{FF2B5EF4-FFF2-40B4-BE49-F238E27FC236}">
+                <a16:creationId xmlns:a16="http://schemas.microsoft.com/office/drawing/2014/main" id="{B0D63A05-1B5F-F916-3C25-1C57B251A0A9}"/>
+              </a:ext>
+            </a:extLst>
+          </p:cNvPr>
+          <p:cNvSpPr>
+            <a:spLocks noGrp="1"/>
+          </p:cNvSpPr>
+          <p:nvPr>
+            <p:ph type="sldNum" sz="quarter" idx="10"/>
+          </p:nvPr>
+        </p:nvSpPr>
+        <p:spPr>
+          <a:xfrm>
+            <a:off x="11484634" y="6650966"/>
+            <a:ext cx="370936" cy="207034"/>
+          </a:xfrm>
+          <a:prstGeom prst="rect">
+            <a:avLst/>
+          </a:prstGeom>
+        </p:spPr>
+        <p:txBody>
+          <a:bodyPr/>
+          <a:lstStyle>
+            <a:lvl1pPr algn="r">
+              <a:defRPr sz="1000">
+                <a:solidFill>
+                  <a:schemeClr val="bg1"/>
+                </a:solidFill>
+              </a:defRPr>
+            </a:lvl1pPr>
+          </a:lstStyle>
+          <a:p>
+            <a:fld id="{7767393B-85A6-40C1-AB65-A74DA355DB56}" type="slidenum">
+              <a:rPr lang="en-GB" smtClean="0"/>
+              <a:pPr/>
+              <a:t>‹#›</a:t>
+            </a:fld>
+            <a:endParaRPr lang="en-GB"/>
+          </a:p>
+        </p:txBody>
+      </p:sp>
+      <p:sp>
+        <p:nvSpPr>
+          <p:cNvPr id="2" name="Rectangle 1">
+            <a:extLst>
+              <a:ext uri="{FF2B5EF4-FFF2-40B4-BE49-F238E27FC236}">
+                <a16:creationId xmlns:a16="http://schemas.microsoft.com/office/drawing/2014/main" id="{9715A5BD-C30B-1DF2-AA5A-5EF2909EF2E6}"/>
               </a:ext>
             </a:extLst>
           </p:cNvPr>
           <p:cNvSpPr/>
-          <p:nvPr/>
+          <p:nvPr userDrawn="1"/>
         </p:nvSpPr>
         <p:spPr>
           <a:xfrm>
             <a:off x="0" y="101176"/>
-            <a:ext cx="12191999" cy="827008"/>
+            <a:ext cx="12191999" cy="626793"/>
           </a:xfrm>
           <a:prstGeom prst="rect">
             <a:avLst/>
@@ -4877,10 +3413,10 @@
       </p:sp>
       <p:sp>
         <p:nvSpPr>
-          <p:cNvPr id="10" name="Title 1">
-            <a:extLst>
-              <a:ext uri="{FF2B5EF4-FFF2-40B4-BE49-F238E27FC236}">
-                <a16:creationId xmlns:a16="http://schemas.microsoft.com/office/drawing/2014/main" id="{D9F72F79-6B14-C5F0-EDC1-E3E0F8BCA436}"/>
+          <p:cNvPr id="7" name="Title 1">
+            <a:extLst>
+              <a:ext uri="{FF2B5EF4-FFF2-40B4-BE49-F238E27FC236}">
+                <a16:creationId xmlns:a16="http://schemas.microsoft.com/office/drawing/2014/main" id="{12732B46-CB3D-86AF-F5C0-E7A3060781F6}"/>
               </a:ext>
             </a:extLst>
           </p:cNvPr>
@@ -4893,8 +3429,8 @@
         </p:nvSpPr>
         <p:spPr>
           <a:xfrm>
-            <a:off x="326590" y="101175"/>
-            <a:ext cx="10881880" cy="827009"/>
+            <a:off x="177800" y="101175"/>
+            <a:ext cx="11836400" cy="626793"/>
           </a:xfrm>
           <a:prstGeom prst="rect">
             <a:avLst/>
@@ -4918,19 +3454,49 @@
           </a:lstStyle>
           <a:p>
             <a:r>
-              <a:rPr lang="en-US"/>
+              <a:rPr lang="en-US" dirty="0"/>
               <a:t>Click to edit Master title style</a:t>
             </a:r>
             <a:endParaRPr lang="en-GB" dirty="0"/>
           </a:p>
         </p:txBody>
       </p:sp>
-      <p:sp>
-        <p:nvSpPr>
-          <p:cNvPr id="12" name="Slide Number Placeholder 5">
-            <a:extLst>
-              <a:ext uri="{FF2B5EF4-FFF2-40B4-BE49-F238E27FC236}">
-                <a16:creationId xmlns:a16="http://schemas.microsoft.com/office/drawing/2014/main" id="{26D26384-FFA6-46A5-CD52-9800186C7F07}"/>
+    </p:spTree>
+    <p:extLst>
+      <p:ext uri="{BB962C8B-B14F-4D97-AF65-F5344CB8AC3E}">
+        <p14:creationId xmlns:p14="http://schemas.microsoft.com/office/powerpoint/2010/main" val="49639326"/>
+      </p:ext>
+    </p:extLst>
+  </p:cSld>
+  <p:clrMapOvr>
+    <a:masterClrMapping/>
+  </p:clrMapOvr>
+</p:sldLayout>
+</file>
+
+<file path=ppt/slideLayouts/slideLayout8.xml><?xml version="1.0" encoding="utf-8"?>
+<p:sldLayout xmlns:a="http://schemas.openxmlformats.org/drawingml/2006/main" xmlns:r="http://schemas.openxmlformats.org/officeDocument/2006/relationships" xmlns:p="http://schemas.openxmlformats.org/presentationml/2006/main" preserve="1" userDrawn="1">
+  <p:cSld name="Comparison - No Colour">
+    <p:spTree>
+      <p:nvGrpSpPr>
+        <p:cNvPr id="1" name=""/>
+        <p:cNvGrpSpPr/>
+        <p:nvPr/>
+      </p:nvGrpSpPr>
+      <p:grpSpPr>
+        <a:xfrm>
+          <a:off x="0" y="0"/>
+          <a:ext cx="0" cy="0"/>
+          <a:chOff x="0" y="0"/>
+          <a:chExt cx="0" cy="0"/>
+        </a:xfrm>
+      </p:grpSpPr>
+      <p:sp>
+        <p:nvSpPr>
+          <p:cNvPr id="3" name="Text Placeholder 2">
+            <a:extLst>
+              <a:ext uri="{FF2B5EF4-FFF2-40B4-BE49-F238E27FC236}">
+                <a16:creationId xmlns:a16="http://schemas.microsoft.com/office/drawing/2014/main" id="{A7EE70C0-0004-DA5B-411C-22A2E3426F32}"/>
               </a:ext>
             </a:extLst>
           </p:cNvPr>
@@ -4938,7 +3504,264 @@
             <a:spLocks noGrp="1"/>
           </p:cNvSpPr>
           <p:nvPr>
-            <p:ph type="sldNum" sz="quarter" idx="4"/>
+            <p:ph type="body" idx="1"/>
+          </p:nvPr>
+        </p:nvSpPr>
+        <p:spPr>
+          <a:xfrm>
+            <a:off x="177800" y="870930"/>
+            <a:ext cx="5842000" cy="659877"/>
+          </a:xfrm>
+          <a:prstGeom prst="rect">
+            <a:avLst/>
+          </a:prstGeom>
+          <a:noFill/>
+        </p:spPr>
+        <p:txBody>
+          <a:bodyPr anchor="b"/>
+          <a:lstStyle>
+            <a:lvl1pPr marL="0" indent="0">
+              <a:buNone/>
+              <a:defRPr sz="2800" b="1">
+                <a:solidFill>
+                  <a:schemeClr val="tx1"/>
+                </a:solidFill>
+              </a:defRPr>
+            </a:lvl1pPr>
+            <a:lvl2pPr marL="457200" indent="0">
+              <a:buNone/>
+              <a:defRPr sz="2000" b="1"/>
+            </a:lvl2pPr>
+            <a:lvl3pPr marL="914400" indent="0">
+              <a:buNone/>
+              <a:defRPr sz="1800" b="1"/>
+            </a:lvl3pPr>
+            <a:lvl4pPr marL="1371600" indent="0">
+              <a:buNone/>
+              <a:defRPr sz="1600" b="1"/>
+            </a:lvl4pPr>
+            <a:lvl5pPr marL="1828800" indent="0">
+              <a:buNone/>
+              <a:defRPr sz="1600" b="1"/>
+            </a:lvl5pPr>
+            <a:lvl6pPr marL="2286000" indent="0">
+              <a:buNone/>
+              <a:defRPr sz="1600" b="1"/>
+            </a:lvl6pPr>
+            <a:lvl7pPr marL="2743200" indent="0">
+              <a:buNone/>
+              <a:defRPr sz="1600" b="1"/>
+            </a:lvl7pPr>
+            <a:lvl8pPr marL="3200400" indent="0">
+              <a:buNone/>
+              <a:defRPr sz="1600" b="1"/>
+            </a:lvl8pPr>
+            <a:lvl9pPr marL="3657600" indent="0">
+              <a:buNone/>
+              <a:defRPr sz="1600" b="1"/>
+            </a:lvl9pPr>
+          </a:lstStyle>
+          <a:p>
+            <a:pPr lvl="0"/>
+            <a:r>
+              <a:rPr lang="en-US"/>
+              <a:t>Click to edit Master text styles</a:t>
+            </a:r>
+          </a:p>
+        </p:txBody>
+      </p:sp>
+      <p:sp>
+        <p:nvSpPr>
+          <p:cNvPr id="4" name="Content Placeholder 3">
+            <a:extLst>
+              <a:ext uri="{FF2B5EF4-FFF2-40B4-BE49-F238E27FC236}">
+                <a16:creationId xmlns:a16="http://schemas.microsoft.com/office/drawing/2014/main" id="{433E7C9F-2EEC-6475-AE93-1246752B2204}"/>
+              </a:ext>
+            </a:extLst>
+          </p:cNvPr>
+          <p:cNvSpPr>
+            <a:spLocks noGrp="1"/>
+          </p:cNvSpPr>
+          <p:nvPr>
+            <p:ph sz="half" idx="2"/>
+          </p:nvPr>
+        </p:nvSpPr>
+        <p:spPr>
+          <a:xfrm>
+            <a:off x="177800" y="1597981"/>
+            <a:ext cx="5842000" cy="4831099"/>
+          </a:xfrm>
+          <a:prstGeom prst="rect">
+            <a:avLst/>
+          </a:prstGeom>
+        </p:spPr>
+        <p:txBody>
+          <a:bodyPr/>
+          <a:lstStyle/>
+          <a:p>
+            <a:pPr lvl="0"/>
+            <a:r>
+              <a:rPr lang="en-US" dirty="0"/>
+              <a:t>Click to edit Master text styles</a:t>
+            </a:r>
+          </a:p>
+          <a:p>
+            <a:pPr lvl="1"/>
+            <a:r>
+              <a:rPr lang="en-US" dirty="0"/>
+              <a:t>Second level</a:t>
+            </a:r>
+          </a:p>
+          <a:p>
+            <a:pPr lvl="2"/>
+            <a:r>
+              <a:rPr lang="en-US" dirty="0"/>
+              <a:t>Third level</a:t>
+            </a:r>
+          </a:p>
+          <a:p>
+            <a:pPr lvl="3"/>
+            <a:r>
+              <a:rPr lang="en-US" dirty="0"/>
+              <a:t>Fourth level</a:t>
+            </a:r>
+          </a:p>
+          <a:p>
+            <a:pPr lvl="4"/>
+            <a:r>
+              <a:rPr lang="en-US" dirty="0"/>
+              <a:t>Fifth level</a:t>
+            </a:r>
+            <a:endParaRPr lang="en-GB" dirty="0"/>
+          </a:p>
+        </p:txBody>
+      </p:sp>
+      <p:sp>
+        <p:nvSpPr>
+          <p:cNvPr id="5" name="Text Placeholder 4">
+            <a:extLst>
+              <a:ext uri="{FF2B5EF4-FFF2-40B4-BE49-F238E27FC236}">
+                <a16:creationId xmlns:a16="http://schemas.microsoft.com/office/drawing/2014/main" id="{6581B006-631F-4BB6-7AFB-4D358EC005E0}"/>
+              </a:ext>
+            </a:extLst>
+          </p:cNvPr>
+          <p:cNvSpPr>
+            <a:spLocks noGrp="1"/>
+          </p:cNvSpPr>
+          <p:nvPr>
+            <p:ph type="body" sz="quarter" idx="3"/>
+          </p:nvPr>
+        </p:nvSpPr>
+        <p:spPr>
+          <a:xfrm>
+            <a:off x="6172199" y="870929"/>
+            <a:ext cx="5842000" cy="659877"/>
+          </a:xfrm>
+          <a:prstGeom prst="rect">
+            <a:avLst/>
+          </a:prstGeom>
+          <a:noFill/>
+        </p:spPr>
+        <p:txBody>
+          <a:bodyPr vert="horz" lIns="91440" tIns="45720" rIns="91440" bIns="45720" rtlCol="0" anchor="b">
+            <a:normAutofit/>
+          </a:bodyPr>
+          <a:lstStyle>
+            <a:lvl1pPr>
+              <a:defRPr lang="en-US" b="1" dirty="0"/>
+            </a:lvl1pPr>
+          </a:lstStyle>
+          <a:p>
+            <a:pPr marL="0" lvl="0" indent="0">
+              <a:buNone/>
+            </a:pPr>
+            <a:r>
+              <a:rPr lang="en-US"/>
+              <a:t>Click to edit Master text styles</a:t>
+            </a:r>
+          </a:p>
+        </p:txBody>
+      </p:sp>
+      <p:sp>
+        <p:nvSpPr>
+          <p:cNvPr id="6" name="Content Placeholder 5">
+            <a:extLst>
+              <a:ext uri="{FF2B5EF4-FFF2-40B4-BE49-F238E27FC236}">
+                <a16:creationId xmlns:a16="http://schemas.microsoft.com/office/drawing/2014/main" id="{4D14FAB4-C3D5-5802-AC62-3F1B0FEE0444}"/>
+              </a:ext>
+            </a:extLst>
+          </p:cNvPr>
+          <p:cNvSpPr>
+            <a:spLocks noGrp="1"/>
+          </p:cNvSpPr>
+          <p:nvPr>
+            <p:ph sz="quarter" idx="4"/>
+          </p:nvPr>
+        </p:nvSpPr>
+        <p:spPr>
+          <a:xfrm>
+            <a:off x="6172199" y="1597981"/>
+            <a:ext cx="5842000" cy="4831099"/>
+          </a:xfrm>
+          <a:prstGeom prst="rect">
+            <a:avLst/>
+          </a:prstGeom>
+        </p:spPr>
+        <p:txBody>
+          <a:bodyPr/>
+          <a:lstStyle/>
+          <a:p>
+            <a:pPr lvl="0"/>
+            <a:r>
+              <a:rPr lang="en-US" dirty="0"/>
+              <a:t>Click to edit Master text styles</a:t>
+            </a:r>
+          </a:p>
+          <a:p>
+            <a:pPr lvl="1"/>
+            <a:r>
+              <a:rPr lang="en-US" dirty="0"/>
+              <a:t>Second level</a:t>
+            </a:r>
+          </a:p>
+          <a:p>
+            <a:pPr lvl="2"/>
+            <a:r>
+              <a:rPr lang="en-US" dirty="0"/>
+              <a:t>Third level</a:t>
+            </a:r>
+          </a:p>
+          <a:p>
+            <a:pPr lvl="3"/>
+            <a:r>
+              <a:rPr lang="en-US" dirty="0"/>
+              <a:t>Fourth level</a:t>
+            </a:r>
+          </a:p>
+          <a:p>
+            <a:pPr lvl="4"/>
+            <a:r>
+              <a:rPr lang="en-US" dirty="0"/>
+              <a:t>Fifth level</a:t>
+            </a:r>
+            <a:endParaRPr lang="en-GB" dirty="0"/>
+          </a:p>
+        </p:txBody>
+      </p:sp>
+      <p:sp>
+        <p:nvSpPr>
+          <p:cNvPr id="13" name="Slide Number Placeholder 5">
+            <a:extLst>
+              <a:ext uri="{FF2B5EF4-FFF2-40B4-BE49-F238E27FC236}">
+                <a16:creationId xmlns:a16="http://schemas.microsoft.com/office/drawing/2014/main" id="{B0D63A05-1B5F-F916-3C25-1C57B251A0A9}"/>
+              </a:ext>
+            </a:extLst>
+          </p:cNvPr>
+          <p:cNvSpPr>
+            <a:spLocks noGrp="1"/>
+          </p:cNvSpPr>
+          <p:nvPr>
+            <p:ph type="sldNum" sz="quarter" idx="10"/>
           </p:nvPr>
         </p:nvSpPr>
         <p:spPr>
@@ -4973,26 +3796,26 @@
       </p:sp>
       <p:sp>
         <p:nvSpPr>
-          <p:cNvPr id="8" name="Parallelogram 7">
-            <a:extLst>
-              <a:ext uri="{FF2B5EF4-FFF2-40B4-BE49-F238E27FC236}">
-                <a16:creationId xmlns:a16="http://schemas.microsoft.com/office/drawing/2014/main" id="{FB879F90-1078-4FC5-A771-BFBDADE11095}"/>
+          <p:cNvPr id="8" name="Rectangle 7">
+            <a:extLst>
+              <a:ext uri="{FF2B5EF4-FFF2-40B4-BE49-F238E27FC236}">
+                <a16:creationId xmlns:a16="http://schemas.microsoft.com/office/drawing/2014/main" id="{CDC1049D-005C-9A98-92A6-EA26837768FF}"/>
               </a:ext>
             </a:extLst>
           </p:cNvPr>
           <p:cNvSpPr/>
-          <p:nvPr/>
-        </p:nvSpPr>
-        <p:spPr>
-          <a:xfrm>
-            <a:off x="11208471" y="159685"/>
-            <a:ext cx="848382" cy="709988"/>
-          </a:xfrm>
-          <a:prstGeom prst="parallelogram">
-            <a:avLst/>
-          </a:prstGeom>
-          <a:solidFill>
-            <a:srgbClr val="F4DB52"/>
+          <p:nvPr userDrawn="1"/>
+        </p:nvSpPr>
+        <p:spPr>
+          <a:xfrm>
+            <a:off x="0" y="101176"/>
+            <a:ext cx="12191999" cy="626793"/>
+          </a:xfrm>
+          <a:prstGeom prst="rect">
+            <a:avLst/>
+          </a:prstGeom>
+          <a:solidFill>
+            <a:srgbClr val="245391"/>
           </a:solidFill>
           <a:ln>
             <a:noFill/>
@@ -5023,49 +3846,60 @@
           </a:p>
         </p:txBody>
       </p:sp>
-      <p:pic>
-        <p:nvPicPr>
-          <p:cNvPr id="11" name="Graphic 10">
-            <a:extLst>
-              <a:ext uri="{FF2B5EF4-FFF2-40B4-BE49-F238E27FC236}">
-                <a16:creationId xmlns:a16="http://schemas.microsoft.com/office/drawing/2014/main" id="{93128CC8-C4FD-AF51-EA57-50FE77C8C227}"/>
-              </a:ext>
-            </a:extLst>
-          </p:cNvPr>
-          <p:cNvPicPr>
-            <a:picLocks noChangeAspect="1"/>
-          </p:cNvPicPr>
-          <p:nvPr/>
-        </p:nvPicPr>
-        <p:blipFill>
-          <a:blip r:embed="rId2">
-            <a:extLst>
-              <a:ext uri="{28A0092B-C50C-407E-A947-70E740481C1C}">
-                <a14:useLocalDpi xmlns:a14="http://schemas.microsoft.com/office/drawing/2010/main" val="0"/>
-              </a:ext>
-              <a:ext uri="{96DAC541-7B7A-43D3-8B79-37D633B846F1}">
-                <asvg:svgBlip xmlns:asvg="http://schemas.microsoft.com/office/drawing/2016/SVG/main" r:embed="rId3"/>
-              </a:ext>
-            </a:extLst>
-          </a:blip>
-          <a:stretch>
-            <a:fillRect/>
-          </a:stretch>
-        </p:blipFill>
-        <p:spPr>
-          <a:xfrm>
-            <a:off x="11419250" y="203307"/>
-            <a:ext cx="426823" cy="622742"/>
-          </a:xfrm>
-          <a:prstGeom prst="rect">
-            <a:avLst/>
-          </a:prstGeom>
-        </p:spPr>
-      </p:pic>
+      <p:sp>
+        <p:nvSpPr>
+          <p:cNvPr id="9" name="Title 1">
+            <a:extLst>
+              <a:ext uri="{FF2B5EF4-FFF2-40B4-BE49-F238E27FC236}">
+                <a16:creationId xmlns:a16="http://schemas.microsoft.com/office/drawing/2014/main" id="{C3611728-BACF-15C0-BBD3-8DA0E07C209A}"/>
+              </a:ext>
+            </a:extLst>
+          </p:cNvPr>
+          <p:cNvSpPr>
+            <a:spLocks noGrp="1"/>
+          </p:cNvSpPr>
+          <p:nvPr>
+            <p:ph type="title"/>
+          </p:nvPr>
+        </p:nvSpPr>
+        <p:spPr>
+          <a:xfrm>
+            <a:off x="177800" y="101175"/>
+            <a:ext cx="11836400" cy="626793"/>
+          </a:xfrm>
+          <a:prstGeom prst="rect">
+            <a:avLst/>
+          </a:prstGeom>
+          <a:solidFill>
+            <a:srgbClr val="245391"/>
+          </a:solidFill>
+        </p:spPr>
+        <p:txBody>
+          <a:bodyPr>
+            <a:normAutofit/>
+          </a:bodyPr>
+          <a:lstStyle>
+            <a:lvl1pPr marL="0" indent="0">
+              <a:defRPr sz="3200" b="1">
+                <a:solidFill>
+                  <a:schemeClr val="bg1"/>
+                </a:solidFill>
+              </a:defRPr>
+            </a:lvl1pPr>
+          </a:lstStyle>
+          <a:p>
+            <a:r>
+              <a:rPr lang="en-US" dirty="0"/>
+              <a:t>Click to edit Master title style</a:t>
+            </a:r>
+            <a:endParaRPr lang="en-GB" dirty="0"/>
+          </a:p>
+        </p:txBody>
+      </p:sp>
     </p:spTree>
     <p:extLst>
       <p:ext uri="{BB962C8B-B14F-4D97-AF65-F5344CB8AC3E}">
-        <p14:creationId xmlns:p14="http://schemas.microsoft.com/office/powerpoint/2010/main" val="2738861046"/>
+        <p14:creationId xmlns:p14="http://schemas.microsoft.com/office/powerpoint/2010/main" val="1632882156"/>
       </p:ext>
     </p:extLst>
   </p:cSld>
@@ -5075,9 +3909,9 @@
 </p:sldLayout>
 </file>
 
-<file path=ppt/slideLayouts/slideLayout7.xml><?xml version="1.0" encoding="utf-8"?>
-<p:sldLayout xmlns:a="http://schemas.openxmlformats.org/drawingml/2006/main" xmlns:r="http://schemas.openxmlformats.org/officeDocument/2006/relationships" xmlns:p="http://schemas.openxmlformats.org/presentationml/2006/main" preserve="1">
-  <p:cSld name="Two Content - Light Blue Green">
+<file path=ppt/slideLayouts/slideLayout9.xml><?xml version="1.0" encoding="utf-8"?>
+<p:sldLayout xmlns:a="http://schemas.openxmlformats.org/drawingml/2006/main" xmlns:r="http://schemas.openxmlformats.org/officeDocument/2006/relationships" xmlns:p="http://schemas.openxmlformats.org/presentationml/2006/main" preserve="1" userDrawn="1">
+  <p:cSld name="Title Only">
     <p:spTree>
       <p:nvGrpSpPr>
         <p:cNvPr id="1" name=""/>
@@ -5094,10 +3928,10 @@
       </p:grpSpPr>
       <p:sp>
         <p:nvSpPr>
-          <p:cNvPr id="3" name="Content Placeholder 2">
-            <a:extLst>
-              <a:ext uri="{FF2B5EF4-FFF2-40B4-BE49-F238E27FC236}">
-                <a16:creationId xmlns:a16="http://schemas.microsoft.com/office/drawing/2014/main" id="{FFB3E276-45A6-3182-E191-0D21CECBD5BF}"/>
+          <p:cNvPr id="9" name="Slide Number Placeholder 5">
+            <a:extLst>
+              <a:ext uri="{FF2B5EF4-FFF2-40B4-BE49-F238E27FC236}">
+                <a16:creationId xmlns:a16="http://schemas.microsoft.com/office/drawing/2014/main" id="{D40D9E9B-695B-7E25-3359-992FB8379BE0}"/>
               </a:ext>
             </a:extLst>
           </p:cNvPr>
@@ -5105,147 +3939,54 @@
             <a:spLocks noGrp="1"/>
           </p:cNvSpPr>
           <p:nvPr>
-            <p:ph sz="half" idx="1"/>
+            <p:ph type="sldNum" sz="quarter" idx="4"/>
           </p:nvPr>
         </p:nvSpPr>
         <p:spPr>
           <a:xfrm>
-            <a:off x="326590" y="1150070"/>
-            <a:ext cx="5693210" cy="5279010"/>
-          </a:xfrm>
-          <a:prstGeom prst="rect">
-            <a:avLst/>
-          </a:prstGeom>
-          <a:solidFill>
-            <a:srgbClr val="90D098"/>
-          </a:solidFill>
+            <a:off x="11484634" y="6650966"/>
+            <a:ext cx="370936" cy="207034"/>
+          </a:xfrm>
+          <a:prstGeom prst="rect">
+            <a:avLst/>
+          </a:prstGeom>
         </p:spPr>
         <p:txBody>
           <a:bodyPr/>
-          <a:lstStyle/>
-          <a:p>
-            <a:pPr lvl="0"/>
-            <a:r>
-              <a:rPr lang="en-US"/>
-              <a:t>Click to edit Master text styles</a:t>
-            </a:r>
-          </a:p>
-          <a:p>
-            <a:pPr lvl="1"/>
-            <a:r>
-              <a:rPr lang="en-US"/>
-              <a:t>Second level</a:t>
-            </a:r>
-          </a:p>
-          <a:p>
-            <a:pPr lvl="2"/>
-            <a:r>
-              <a:rPr lang="en-US"/>
-              <a:t>Third level</a:t>
-            </a:r>
-          </a:p>
-          <a:p>
-            <a:pPr lvl="3"/>
-            <a:r>
-              <a:rPr lang="en-US"/>
-              <a:t>Fourth level</a:t>
-            </a:r>
-          </a:p>
-          <a:p>
-            <a:pPr lvl="4"/>
-            <a:r>
-              <a:rPr lang="en-US"/>
-              <a:t>Fifth level</a:t>
-            </a:r>
-            <a:endParaRPr lang="en-GB" dirty="0"/>
-          </a:p>
-        </p:txBody>
-      </p:sp>
-      <p:sp>
-        <p:nvSpPr>
-          <p:cNvPr id="4" name="Content Placeholder 3">
-            <a:extLst>
-              <a:ext uri="{FF2B5EF4-FFF2-40B4-BE49-F238E27FC236}">
-                <a16:creationId xmlns:a16="http://schemas.microsoft.com/office/drawing/2014/main" id="{24DAC9F3-A161-D5C8-4EB3-26AE99A810B4}"/>
-              </a:ext>
-            </a:extLst>
-          </p:cNvPr>
-          <p:cNvSpPr>
-            <a:spLocks noGrp="1"/>
-          </p:cNvSpPr>
-          <p:nvPr>
-            <p:ph sz="half" idx="2"/>
-          </p:nvPr>
-        </p:nvSpPr>
-        <p:spPr>
-          <a:xfrm>
-            <a:off x="6172202" y="1150070"/>
-            <a:ext cx="5683368" cy="5279010"/>
-          </a:xfrm>
-          <a:prstGeom prst="rect">
-            <a:avLst/>
-          </a:prstGeom>
-          <a:solidFill>
-            <a:srgbClr val="93E3FF"/>
-          </a:solidFill>
-        </p:spPr>
-        <p:txBody>
-          <a:bodyPr/>
-          <a:lstStyle/>
-          <a:p>
-            <a:pPr lvl="0"/>
-            <a:r>
-              <a:rPr lang="en-US"/>
-              <a:t>Click to edit Master text styles</a:t>
-            </a:r>
-          </a:p>
-          <a:p>
-            <a:pPr lvl="1"/>
-            <a:r>
-              <a:rPr lang="en-US"/>
-              <a:t>Second level</a:t>
-            </a:r>
-          </a:p>
-          <a:p>
-            <a:pPr lvl="2"/>
-            <a:r>
-              <a:rPr lang="en-US"/>
-              <a:t>Third level</a:t>
-            </a:r>
-          </a:p>
-          <a:p>
-            <a:pPr lvl="3"/>
-            <a:r>
-              <a:rPr lang="en-US"/>
-              <a:t>Fourth level</a:t>
-            </a:r>
-          </a:p>
-          <a:p>
-            <a:pPr lvl="4"/>
-            <a:r>
-              <a:rPr lang="en-US"/>
-              <a:t>Fifth level</a:t>
-            </a:r>
-            <a:endParaRPr lang="en-GB" dirty="0"/>
-          </a:p>
-        </p:txBody>
-      </p:sp>
-      <p:sp>
-        <p:nvSpPr>
-          <p:cNvPr id="9" name="Rectangle 8">
-            <a:extLst>
-              <a:ext uri="{FF2B5EF4-FFF2-40B4-BE49-F238E27FC236}">
-                <a16:creationId xmlns:a16="http://schemas.microsoft.com/office/drawing/2014/main" id="{43E97568-94FD-F797-00D0-A204C8758D41}"/>
+          <a:lstStyle>
+            <a:lvl1pPr algn="r">
+              <a:defRPr sz="1000">
+                <a:solidFill>
+                  <a:schemeClr val="bg1"/>
+                </a:solidFill>
+              </a:defRPr>
+            </a:lvl1pPr>
+          </a:lstStyle>
+          <a:p>
+            <a:fld id="{7767393B-85A6-40C1-AB65-A74DA355DB56}" type="slidenum">
+              <a:rPr lang="en-GB" smtClean="0"/>
+              <a:t>‹#›</a:t>
+            </a:fld>
+            <a:endParaRPr lang="en-GB"/>
+          </a:p>
+        </p:txBody>
+      </p:sp>
+      <p:sp>
+        <p:nvSpPr>
+          <p:cNvPr id="2" name="Rectangle 1">
+            <a:extLst>
+              <a:ext uri="{FF2B5EF4-FFF2-40B4-BE49-F238E27FC236}">
+                <a16:creationId xmlns:a16="http://schemas.microsoft.com/office/drawing/2014/main" id="{2840CFFE-17F8-F107-DB82-0F90AA96BCAF}"/>
               </a:ext>
             </a:extLst>
           </p:cNvPr>
           <p:cNvSpPr/>
-          <p:nvPr/>
+          <p:nvPr userDrawn="1"/>
         </p:nvSpPr>
         <p:spPr>
           <a:xfrm>
             <a:off x="0" y="101176"/>
-            <a:ext cx="12191999" cy="827008"/>
+            <a:ext cx="12191999" cy="626793"/>
           </a:xfrm>
           <a:prstGeom prst="rect">
             <a:avLst/>
@@ -5284,10 +4025,10 @@
       </p:sp>
       <p:sp>
         <p:nvSpPr>
-          <p:cNvPr id="10" name="Title 1">
-            <a:extLst>
-              <a:ext uri="{FF2B5EF4-FFF2-40B4-BE49-F238E27FC236}">
-                <a16:creationId xmlns:a16="http://schemas.microsoft.com/office/drawing/2014/main" id="{D9F72F79-6B14-C5F0-EDC1-E3E0F8BCA436}"/>
+          <p:cNvPr id="3" name="Title 1">
+            <a:extLst>
+              <a:ext uri="{FF2B5EF4-FFF2-40B4-BE49-F238E27FC236}">
+                <a16:creationId xmlns:a16="http://schemas.microsoft.com/office/drawing/2014/main" id="{F784284F-4D91-6A88-EF4B-E2107692B7FF}"/>
               </a:ext>
             </a:extLst>
           </p:cNvPr>
@@ -5300,8 +4041,8 @@
         </p:nvSpPr>
         <p:spPr>
           <a:xfrm>
-            <a:off x="326590" y="101175"/>
-            <a:ext cx="10881880" cy="827009"/>
+            <a:off x="177800" y="101175"/>
+            <a:ext cx="11836400" cy="626793"/>
           </a:xfrm>
           <a:prstGeom prst="rect">
             <a:avLst/>
@@ -5325,1095 +4066,17 @@
           </a:lstStyle>
           <a:p>
             <a:r>
-              <a:rPr lang="en-US"/>
+              <a:rPr lang="en-US" dirty="0"/>
               <a:t>Click to edit Master title style</a:t>
             </a:r>
             <a:endParaRPr lang="en-GB" dirty="0"/>
           </a:p>
         </p:txBody>
       </p:sp>
-      <p:sp>
-        <p:nvSpPr>
-          <p:cNvPr id="12" name="Slide Number Placeholder 5">
-            <a:extLst>
-              <a:ext uri="{FF2B5EF4-FFF2-40B4-BE49-F238E27FC236}">
-                <a16:creationId xmlns:a16="http://schemas.microsoft.com/office/drawing/2014/main" id="{26D26384-FFA6-46A5-CD52-9800186C7F07}"/>
-              </a:ext>
-            </a:extLst>
-          </p:cNvPr>
-          <p:cNvSpPr>
-            <a:spLocks noGrp="1"/>
-          </p:cNvSpPr>
-          <p:nvPr>
-            <p:ph type="sldNum" sz="quarter" idx="4"/>
-          </p:nvPr>
-        </p:nvSpPr>
-        <p:spPr>
-          <a:xfrm>
-            <a:off x="11484634" y="6650966"/>
-            <a:ext cx="370936" cy="207034"/>
-          </a:xfrm>
-          <a:prstGeom prst="rect">
-            <a:avLst/>
-          </a:prstGeom>
-        </p:spPr>
-        <p:txBody>
-          <a:bodyPr/>
-          <a:lstStyle>
-            <a:lvl1pPr algn="r">
-              <a:defRPr sz="1000">
-                <a:solidFill>
-                  <a:schemeClr val="bg1"/>
-                </a:solidFill>
-              </a:defRPr>
-            </a:lvl1pPr>
-          </a:lstStyle>
-          <a:p>
-            <a:fld id="{7767393B-85A6-40C1-AB65-A74DA355DB56}" type="slidenum">
-              <a:rPr lang="en-GB" smtClean="0"/>
-              <a:pPr/>
-              <a:t>‹#›</a:t>
-            </a:fld>
-            <a:endParaRPr lang="en-GB"/>
-          </a:p>
-        </p:txBody>
-      </p:sp>
-      <p:sp>
-        <p:nvSpPr>
-          <p:cNvPr id="8" name="Parallelogram 7">
-            <a:extLst>
-              <a:ext uri="{FF2B5EF4-FFF2-40B4-BE49-F238E27FC236}">
-                <a16:creationId xmlns:a16="http://schemas.microsoft.com/office/drawing/2014/main" id="{618BE6D4-32A9-CFD0-42B7-4B6C09268313}"/>
-              </a:ext>
-            </a:extLst>
-          </p:cNvPr>
-          <p:cNvSpPr/>
-          <p:nvPr/>
-        </p:nvSpPr>
-        <p:spPr>
-          <a:xfrm>
-            <a:off x="11208471" y="159685"/>
-            <a:ext cx="848382" cy="709988"/>
-          </a:xfrm>
-          <a:prstGeom prst="parallelogram">
-            <a:avLst/>
-          </a:prstGeom>
-          <a:solidFill>
-            <a:srgbClr val="F4DB52"/>
-          </a:solidFill>
-          <a:ln>
-            <a:noFill/>
-          </a:ln>
-        </p:spPr>
-        <p:style>
-          <a:lnRef idx="2">
-            <a:schemeClr val="accent1">
-              <a:shade val="50000"/>
-            </a:schemeClr>
-          </a:lnRef>
-          <a:fillRef idx="1">
-            <a:schemeClr val="accent1"/>
-          </a:fillRef>
-          <a:effectRef idx="0">
-            <a:schemeClr val="accent1"/>
-          </a:effectRef>
-          <a:fontRef idx="minor">
-            <a:schemeClr val="lt1"/>
-          </a:fontRef>
-        </p:style>
-        <p:txBody>
-          <a:bodyPr rtlCol="0" anchor="ctr"/>
-          <a:lstStyle/>
-          <a:p>
-            <a:pPr algn="ctr"/>
-            <a:endParaRPr lang="en-GB"/>
-          </a:p>
-        </p:txBody>
-      </p:sp>
-      <p:pic>
-        <p:nvPicPr>
-          <p:cNvPr id="11" name="Graphic 10">
-            <a:extLst>
-              <a:ext uri="{FF2B5EF4-FFF2-40B4-BE49-F238E27FC236}">
-                <a16:creationId xmlns:a16="http://schemas.microsoft.com/office/drawing/2014/main" id="{4951A4F1-A570-0653-2E48-7C6806CF6C7B}"/>
-              </a:ext>
-            </a:extLst>
-          </p:cNvPr>
-          <p:cNvPicPr>
-            <a:picLocks noChangeAspect="1"/>
-          </p:cNvPicPr>
-          <p:nvPr/>
-        </p:nvPicPr>
-        <p:blipFill>
-          <a:blip r:embed="rId2">
-            <a:extLst>
-              <a:ext uri="{28A0092B-C50C-407E-A947-70E740481C1C}">
-                <a14:useLocalDpi xmlns:a14="http://schemas.microsoft.com/office/drawing/2010/main" val="0"/>
-              </a:ext>
-              <a:ext uri="{96DAC541-7B7A-43D3-8B79-37D633B846F1}">
-                <asvg:svgBlip xmlns:asvg="http://schemas.microsoft.com/office/drawing/2016/SVG/main" r:embed="rId3"/>
-              </a:ext>
-            </a:extLst>
-          </a:blip>
-          <a:stretch>
-            <a:fillRect/>
-          </a:stretch>
-        </p:blipFill>
-        <p:spPr>
-          <a:xfrm>
-            <a:off x="11419250" y="203307"/>
-            <a:ext cx="426823" cy="622742"/>
-          </a:xfrm>
-          <a:prstGeom prst="rect">
-            <a:avLst/>
-          </a:prstGeom>
-        </p:spPr>
-      </p:pic>
     </p:spTree>
     <p:extLst>
       <p:ext uri="{BB962C8B-B14F-4D97-AF65-F5344CB8AC3E}">
-        <p14:creationId xmlns:p14="http://schemas.microsoft.com/office/powerpoint/2010/main" val="3306355477"/>
-      </p:ext>
-    </p:extLst>
-  </p:cSld>
-  <p:clrMapOvr>
-    <a:masterClrMapping/>
-  </p:clrMapOvr>
-</p:sldLayout>
-</file>
-
-<file path=ppt/slideLayouts/slideLayout8.xml><?xml version="1.0" encoding="utf-8"?>
-<p:sldLayout xmlns:a="http://schemas.openxmlformats.org/drawingml/2006/main" xmlns:r="http://schemas.openxmlformats.org/officeDocument/2006/relationships" xmlns:p="http://schemas.openxmlformats.org/presentationml/2006/main" preserve="1">
-  <p:cSld name="Two Content - Yellow Light Blue">
-    <p:spTree>
-      <p:nvGrpSpPr>
-        <p:cNvPr id="1" name=""/>
-        <p:cNvGrpSpPr/>
-        <p:nvPr/>
-      </p:nvGrpSpPr>
-      <p:grpSpPr>
-        <a:xfrm>
-          <a:off x="0" y="0"/>
-          <a:ext cx="0" cy="0"/>
-          <a:chOff x="0" y="0"/>
-          <a:chExt cx="0" cy="0"/>
-        </a:xfrm>
-      </p:grpSpPr>
-      <p:sp>
-        <p:nvSpPr>
-          <p:cNvPr id="3" name="Content Placeholder 2">
-            <a:extLst>
-              <a:ext uri="{FF2B5EF4-FFF2-40B4-BE49-F238E27FC236}">
-                <a16:creationId xmlns:a16="http://schemas.microsoft.com/office/drawing/2014/main" id="{FFB3E276-45A6-3182-E191-0D21CECBD5BF}"/>
-              </a:ext>
-            </a:extLst>
-          </p:cNvPr>
-          <p:cNvSpPr>
-            <a:spLocks noGrp="1"/>
-          </p:cNvSpPr>
-          <p:nvPr>
-            <p:ph sz="half" idx="1"/>
-          </p:nvPr>
-        </p:nvSpPr>
-        <p:spPr>
-          <a:xfrm>
-            <a:off x="326590" y="1150070"/>
-            <a:ext cx="5693210" cy="5279010"/>
-          </a:xfrm>
-          <a:prstGeom prst="rect">
-            <a:avLst/>
-          </a:prstGeom>
-          <a:solidFill>
-            <a:srgbClr val="F8E992"/>
-          </a:solidFill>
-        </p:spPr>
-        <p:txBody>
-          <a:bodyPr/>
-          <a:lstStyle/>
-          <a:p>
-            <a:pPr lvl="0"/>
-            <a:r>
-              <a:rPr lang="en-US"/>
-              <a:t>Click to edit Master text styles</a:t>
-            </a:r>
-          </a:p>
-          <a:p>
-            <a:pPr lvl="1"/>
-            <a:r>
-              <a:rPr lang="en-US"/>
-              <a:t>Second level</a:t>
-            </a:r>
-          </a:p>
-          <a:p>
-            <a:pPr lvl="2"/>
-            <a:r>
-              <a:rPr lang="en-US"/>
-              <a:t>Third level</a:t>
-            </a:r>
-          </a:p>
-          <a:p>
-            <a:pPr lvl="3"/>
-            <a:r>
-              <a:rPr lang="en-US"/>
-              <a:t>Fourth level</a:t>
-            </a:r>
-          </a:p>
-          <a:p>
-            <a:pPr lvl="4"/>
-            <a:r>
-              <a:rPr lang="en-US"/>
-              <a:t>Fifth level</a:t>
-            </a:r>
-            <a:endParaRPr lang="en-GB"/>
-          </a:p>
-        </p:txBody>
-      </p:sp>
-      <p:sp>
-        <p:nvSpPr>
-          <p:cNvPr id="4" name="Content Placeholder 3">
-            <a:extLst>
-              <a:ext uri="{FF2B5EF4-FFF2-40B4-BE49-F238E27FC236}">
-                <a16:creationId xmlns:a16="http://schemas.microsoft.com/office/drawing/2014/main" id="{24DAC9F3-A161-D5C8-4EB3-26AE99A810B4}"/>
-              </a:ext>
-            </a:extLst>
-          </p:cNvPr>
-          <p:cNvSpPr>
-            <a:spLocks noGrp="1"/>
-          </p:cNvSpPr>
-          <p:nvPr>
-            <p:ph sz="half" idx="2"/>
-          </p:nvPr>
-        </p:nvSpPr>
-        <p:spPr>
-          <a:xfrm>
-            <a:off x="6172202" y="1150070"/>
-            <a:ext cx="5683368" cy="5279010"/>
-          </a:xfrm>
-          <a:prstGeom prst="rect">
-            <a:avLst/>
-          </a:prstGeom>
-          <a:solidFill>
-            <a:srgbClr val="93E3FF"/>
-          </a:solidFill>
-        </p:spPr>
-        <p:txBody>
-          <a:bodyPr/>
-          <a:lstStyle/>
-          <a:p>
-            <a:pPr lvl="0"/>
-            <a:r>
-              <a:rPr lang="en-US"/>
-              <a:t>Click to edit Master text styles</a:t>
-            </a:r>
-          </a:p>
-          <a:p>
-            <a:pPr lvl="1"/>
-            <a:r>
-              <a:rPr lang="en-US"/>
-              <a:t>Second level</a:t>
-            </a:r>
-          </a:p>
-          <a:p>
-            <a:pPr lvl="2"/>
-            <a:r>
-              <a:rPr lang="en-US"/>
-              <a:t>Third level</a:t>
-            </a:r>
-          </a:p>
-          <a:p>
-            <a:pPr lvl="3"/>
-            <a:r>
-              <a:rPr lang="en-US"/>
-              <a:t>Fourth level</a:t>
-            </a:r>
-          </a:p>
-          <a:p>
-            <a:pPr lvl="4"/>
-            <a:r>
-              <a:rPr lang="en-US"/>
-              <a:t>Fifth level</a:t>
-            </a:r>
-            <a:endParaRPr lang="en-GB"/>
-          </a:p>
-        </p:txBody>
-      </p:sp>
-      <p:sp>
-        <p:nvSpPr>
-          <p:cNvPr id="9" name="Rectangle 8">
-            <a:extLst>
-              <a:ext uri="{FF2B5EF4-FFF2-40B4-BE49-F238E27FC236}">
-                <a16:creationId xmlns:a16="http://schemas.microsoft.com/office/drawing/2014/main" id="{43E97568-94FD-F797-00D0-A204C8758D41}"/>
-              </a:ext>
-            </a:extLst>
-          </p:cNvPr>
-          <p:cNvSpPr/>
-          <p:nvPr/>
-        </p:nvSpPr>
-        <p:spPr>
-          <a:xfrm>
-            <a:off x="0" y="101176"/>
-            <a:ext cx="12191999" cy="827008"/>
-          </a:xfrm>
-          <a:prstGeom prst="rect">
-            <a:avLst/>
-          </a:prstGeom>
-          <a:solidFill>
-            <a:srgbClr val="245391"/>
-          </a:solidFill>
-          <a:ln>
-            <a:noFill/>
-          </a:ln>
-        </p:spPr>
-        <p:style>
-          <a:lnRef idx="2">
-            <a:schemeClr val="accent1">
-              <a:shade val="50000"/>
-            </a:schemeClr>
-          </a:lnRef>
-          <a:fillRef idx="1">
-            <a:schemeClr val="accent1"/>
-          </a:fillRef>
-          <a:effectRef idx="0">
-            <a:schemeClr val="accent1"/>
-          </a:effectRef>
-          <a:fontRef idx="minor">
-            <a:schemeClr val="lt1"/>
-          </a:fontRef>
-        </p:style>
-        <p:txBody>
-          <a:bodyPr rtlCol="0" anchor="ctr"/>
-          <a:lstStyle/>
-          <a:p>
-            <a:pPr algn="ctr"/>
-            <a:endParaRPr lang="en-GB"/>
-          </a:p>
-        </p:txBody>
-      </p:sp>
-      <p:sp>
-        <p:nvSpPr>
-          <p:cNvPr id="10" name="Title 1">
-            <a:extLst>
-              <a:ext uri="{FF2B5EF4-FFF2-40B4-BE49-F238E27FC236}">
-                <a16:creationId xmlns:a16="http://schemas.microsoft.com/office/drawing/2014/main" id="{D9F72F79-6B14-C5F0-EDC1-E3E0F8BCA436}"/>
-              </a:ext>
-            </a:extLst>
-          </p:cNvPr>
-          <p:cNvSpPr>
-            <a:spLocks noGrp="1"/>
-          </p:cNvSpPr>
-          <p:nvPr>
-            <p:ph type="title"/>
-          </p:nvPr>
-        </p:nvSpPr>
-        <p:spPr>
-          <a:xfrm>
-            <a:off x="326590" y="101175"/>
-            <a:ext cx="10881880" cy="827009"/>
-          </a:xfrm>
-          <a:prstGeom prst="rect">
-            <a:avLst/>
-          </a:prstGeom>
-          <a:solidFill>
-            <a:srgbClr val="245391"/>
-          </a:solidFill>
-        </p:spPr>
-        <p:txBody>
-          <a:bodyPr>
-            <a:normAutofit/>
-          </a:bodyPr>
-          <a:lstStyle>
-            <a:lvl1pPr marL="0" indent="0">
-              <a:defRPr sz="3200" b="1">
-                <a:solidFill>
-                  <a:schemeClr val="bg1"/>
-                </a:solidFill>
-              </a:defRPr>
-            </a:lvl1pPr>
-          </a:lstStyle>
-          <a:p>
-            <a:r>
-              <a:rPr lang="en-US"/>
-              <a:t>Click to edit Master title style</a:t>
-            </a:r>
-            <a:endParaRPr lang="en-GB" dirty="0"/>
-          </a:p>
-        </p:txBody>
-      </p:sp>
-      <p:sp>
-        <p:nvSpPr>
-          <p:cNvPr id="12" name="Slide Number Placeholder 5">
-            <a:extLst>
-              <a:ext uri="{FF2B5EF4-FFF2-40B4-BE49-F238E27FC236}">
-                <a16:creationId xmlns:a16="http://schemas.microsoft.com/office/drawing/2014/main" id="{26D26384-FFA6-46A5-CD52-9800186C7F07}"/>
-              </a:ext>
-            </a:extLst>
-          </p:cNvPr>
-          <p:cNvSpPr>
-            <a:spLocks noGrp="1"/>
-          </p:cNvSpPr>
-          <p:nvPr>
-            <p:ph type="sldNum" sz="quarter" idx="4"/>
-          </p:nvPr>
-        </p:nvSpPr>
-        <p:spPr>
-          <a:xfrm>
-            <a:off x="11484634" y="6650966"/>
-            <a:ext cx="370936" cy="207034"/>
-          </a:xfrm>
-          <a:prstGeom prst="rect">
-            <a:avLst/>
-          </a:prstGeom>
-        </p:spPr>
-        <p:txBody>
-          <a:bodyPr/>
-          <a:lstStyle>
-            <a:lvl1pPr algn="r">
-              <a:defRPr sz="1000">
-                <a:solidFill>
-                  <a:schemeClr val="bg1"/>
-                </a:solidFill>
-              </a:defRPr>
-            </a:lvl1pPr>
-          </a:lstStyle>
-          <a:p>
-            <a:fld id="{7767393B-85A6-40C1-AB65-A74DA355DB56}" type="slidenum">
-              <a:rPr lang="en-GB" smtClean="0"/>
-              <a:pPr/>
-              <a:t>‹#›</a:t>
-            </a:fld>
-            <a:endParaRPr lang="en-GB"/>
-          </a:p>
-        </p:txBody>
-      </p:sp>
-      <p:sp>
-        <p:nvSpPr>
-          <p:cNvPr id="8" name="Parallelogram 7">
-            <a:extLst>
-              <a:ext uri="{FF2B5EF4-FFF2-40B4-BE49-F238E27FC236}">
-                <a16:creationId xmlns:a16="http://schemas.microsoft.com/office/drawing/2014/main" id="{82DA5731-8A5B-69D6-3C61-E5683620AAE5}"/>
-              </a:ext>
-            </a:extLst>
-          </p:cNvPr>
-          <p:cNvSpPr/>
-          <p:nvPr/>
-        </p:nvSpPr>
-        <p:spPr>
-          <a:xfrm>
-            <a:off x="11208471" y="159685"/>
-            <a:ext cx="848382" cy="709988"/>
-          </a:xfrm>
-          <a:prstGeom prst="parallelogram">
-            <a:avLst/>
-          </a:prstGeom>
-          <a:solidFill>
-            <a:srgbClr val="F4DB52"/>
-          </a:solidFill>
-          <a:ln>
-            <a:noFill/>
-          </a:ln>
-        </p:spPr>
-        <p:style>
-          <a:lnRef idx="2">
-            <a:schemeClr val="accent1">
-              <a:shade val="50000"/>
-            </a:schemeClr>
-          </a:lnRef>
-          <a:fillRef idx="1">
-            <a:schemeClr val="accent1"/>
-          </a:fillRef>
-          <a:effectRef idx="0">
-            <a:schemeClr val="accent1"/>
-          </a:effectRef>
-          <a:fontRef idx="minor">
-            <a:schemeClr val="lt1"/>
-          </a:fontRef>
-        </p:style>
-        <p:txBody>
-          <a:bodyPr rtlCol="0" anchor="ctr"/>
-          <a:lstStyle/>
-          <a:p>
-            <a:pPr algn="ctr"/>
-            <a:endParaRPr lang="en-GB"/>
-          </a:p>
-        </p:txBody>
-      </p:sp>
-      <p:pic>
-        <p:nvPicPr>
-          <p:cNvPr id="11" name="Graphic 10">
-            <a:extLst>
-              <a:ext uri="{FF2B5EF4-FFF2-40B4-BE49-F238E27FC236}">
-                <a16:creationId xmlns:a16="http://schemas.microsoft.com/office/drawing/2014/main" id="{1FCA787E-B59B-AC95-10A3-295C6F4C534D}"/>
-              </a:ext>
-            </a:extLst>
-          </p:cNvPr>
-          <p:cNvPicPr>
-            <a:picLocks noChangeAspect="1"/>
-          </p:cNvPicPr>
-          <p:nvPr/>
-        </p:nvPicPr>
-        <p:blipFill>
-          <a:blip r:embed="rId2">
-            <a:extLst>
-              <a:ext uri="{28A0092B-C50C-407E-A947-70E740481C1C}">
-                <a14:useLocalDpi xmlns:a14="http://schemas.microsoft.com/office/drawing/2010/main" val="0"/>
-              </a:ext>
-              <a:ext uri="{96DAC541-7B7A-43D3-8B79-37D633B846F1}">
-                <asvg:svgBlip xmlns:asvg="http://schemas.microsoft.com/office/drawing/2016/SVG/main" r:embed="rId3"/>
-              </a:ext>
-            </a:extLst>
-          </a:blip>
-          <a:stretch>
-            <a:fillRect/>
-          </a:stretch>
-        </p:blipFill>
-        <p:spPr>
-          <a:xfrm>
-            <a:off x="11419250" y="203307"/>
-            <a:ext cx="426823" cy="622742"/>
-          </a:xfrm>
-          <a:prstGeom prst="rect">
-            <a:avLst/>
-          </a:prstGeom>
-        </p:spPr>
-      </p:pic>
-    </p:spTree>
-    <p:extLst>
-      <p:ext uri="{BB962C8B-B14F-4D97-AF65-F5344CB8AC3E}">
-        <p14:creationId xmlns:p14="http://schemas.microsoft.com/office/powerpoint/2010/main" val="430681399"/>
-      </p:ext>
-    </p:extLst>
-  </p:cSld>
-  <p:clrMapOvr>
-    <a:masterClrMapping/>
-  </p:clrMapOvr>
-</p:sldLayout>
-</file>
-
-<file path=ppt/slideLayouts/slideLayout9.xml><?xml version="1.0" encoding="utf-8"?>
-<p:sldLayout xmlns:a="http://schemas.openxmlformats.org/drawingml/2006/main" xmlns:r="http://schemas.openxmlformats.org/officeDocument/2006/relationships" xmlns:p="http://schemas.openxmlformats.org/presentationml/2006/main" preserve="1">
-  <p:cSld name="Comparison - Light Blue Sub-Header">
-    <p:spTree>
-      <p:nvGrpSpPr>
-        <p:cNvPr id="1" name=""/>
-        <p:cNvGrpSpPr/>
-        <p:nvPr/>
-      </p:nvGrpSpPr>
-      <p:grpSpPr>
-        <a:xfrm>
-          <a:off x="0" y="0"/>
-          <a:ext cx="0" cy="0"/>
-          <a:chOff x="0" y="0"/>
-          <a:chExt cx="0" cy="0"/>
-        </a:xfrm>
-      </p:grpSpPr>
-      <p:sp>
-        <p:nvSpPr>
-          <p:cNvPr id="3" name="Text Placeholder 2">
-            <a:extLst>
-              <a:ext uri="{FF2B5EF4-FFF2-40B4-BE49-F238E27FC236}">
-                <a16:creationId xmlns:a16="http://schemas.microsoft.com/office/drawing/2014/main" id="{A7EE70C0-0004-DA5B-411C-22A2E3426F32}"/>
-              </a:ext>
-            </a:extLst>
-          </p:cNvPr>
-          <p:cNvSpPr>
-            <a:spLocks noGrp="1"/>
-          </p:cNvSpPr>
-          <p:nvPr>
-            <p:ph type="body" idx="1"/>
-          </p:nvPr>
-        </p:nvSpPr>
-        <p:spPr>
-          <a:xfrm>
-            <a:off x="326590" y="1150069"/>
-            <a:ext cx="5693210" cy="659877"/>
-          </a:xfrm>
-          <a:prstGeom prst="rect">
-            <a:avLst/>
-          </a:prstGeom>
-          <a:solidFill>
-            <a:srgbClr val="00A1D7"/>
-          </a:solidFill>
-        </p:spPr>
-        <p:txBody>
-          <a:bodyPr anchor="b"/>
-          <a:lstStyle>
-            <a:lvl1pPr marL="0" indent="0">
-              <a:buNone/>
-              <a:defRPr sz="2800" b="1">
-                <a:solidFill>
-                  <a:schemeClr val="bg1"/>
-                </a:solidFill>
-              </a:defRPr>
-            </a:lvl1pPr>
-            <a:lvl2pPr marL="457200" indent="0">
-              <a:buNone/>
-              <a:defRPr sz="2000" b="1"/>
-            </a:lvl2pPr>
-            <a:lvl3pPr marL="914400" indent="0">
-              <a:buNone/>
-              <a:defRPr sz="1800" b="1"/>
-            </a:lvl3pPr>
-            <a:lvl4pPr marL="1371600" indent="0">
-              <a:buNone/>
-              <a:defRPr sz="1600" b="1"/>
-            </a:lvl4pPr>
-            <a:lvl5pPr marL="1828800" indent="0">
-              <a:buNone/>
-              <a:defRPr sz="1600" b="1"/>
-            </a:lvl5pPr>
-            <a:lvl6pPr marL="2286000" indent="0">
-              <a:buNone/>
-              <a:defRPr sz="1600" b="1"/>
-            </a:lvl6pPr>
-            <a:lvl7pPr marL="2743200" indent="0">
-              <a:buNone/>
-              <a:defRPr sz="1600" b="1"/>
-            </a:lvl7pPr>
-            <a:lvl8pPr marL="3200400" indent="0">
-              <a:buNone/>
-              <a:defRPr sz="1600" b="1"/>
-            </a:lvl8pPr>
-            <a:lvl9pPr marL="3657600" indent="0">
-              <a:buNone/>
-              <a:defRPr sz="1600" b="1"/>
-            </a:lvl9pPr>
-          </a:lstStyle>
-          <a:p>
-            <a:pPr lvl="0"/>
-            <a:r>
-              <a:rPr lang="en-US"/>
-              <a:t>Click to edit Master text styles</a:t>
-            </a:r>
-          </a:p>
-        </p:txBody>
-      </p:sp>
-      <p:sp>
-        <p:nvSpPr>
-          <p:cNvPr id="4" name="Content Placeholder 3">
-            <a:extLst>
-              <a:ext uri="{FF2B5EF4-FFF2-40B4-BE49-F238E27FC236}">
-                <a16:creationId xmlns:a16="http://schemas.microsoft.com/office/drawing/2014/main" id="{433E7C9F-2EEC-6475-AE93-1246752B2204}"/>
-              </a:ext>
-            </a:extLst>
-          </p:cNvPr>
-          <p:cNvSpPr>
-            <a:spLocks noGrp="1"/>
-          </p:cNvSpPr>
-          <p:nvPr>
-            <p:ph sz="half" idx="2"/>
-          </p:nvPr>
-        </p:nvSpPr>
-        <p:spPr>
-          <a:xfrm>
-            <a:off x="326590" y="1809946"/>
-            <a:ext cx="5693210" cy="4619134"/>
-          </a:xfrm>
-          <a:prstGeom prst="rect">
-            <a:avLst/>
-          </a:prstGeom>
-        </p:spPr>
-        <p:txBody>
-          <a:bodyPr/>
-          <a:lstStyle/>
-          <a:p>
-            <a:pPr lvl="0"/>
-            <a:r>
-              <a:rPr lang="en-US"/>
-              <a:t>Click to edit Master text styles</a:t>
-            </a:r>
-          </a:p>
-          <a:p>
-            <a:pPr lvl="1"/>
-            <a:r>
-              <a:rPr lang="en-US"/>
-              <a:t>Second level</a:t>
-            </a:r>
-          </a:p>
-          <a:p>
-            <a:pPr lvl="2"/>
-            <a:r>
-              <a:rPr lang="en-US"/>
-              <a:t>Third level</a:t>
-            </a:r>
-          </a:p>
-          <a:p>
-            <a:pPr lvl="3"/>
-            <a:r>
-              <a:rPr lang="en-US"/>
-              <a:t>Fourth level</a:t>
-            </a:r>
-          </a:p>
-          <a:p>
-            <a:pPr lvl="4"/>
-            <a:r>
-              <a:rPr lang="en-US"/>
-              <a:t>Fifth level</a:t>
-            </a:r>
-            <a:endParaRPr lang="en-GB" dirty="0"/>
-          </a:p>
-        </p:txBody>
-      </p:sp>
-      <p:sp>
-        <p:nvSpPr>
-          <p:cNvPr id="5" name="Text Placeholder 4">
-            <a:extLst>
-              <a:ext uri="{FF2B5EF4-FFF2-40B4-BE49-F238E27FC236}">
-                <a16:creationId xmlns:a16="http://schemas.microsoft.com/office/drawing/2014/main" id="{6581B006-631F-4BB6-7AFB-4D358EC005E0}"/>
-              </a:ext>
-            </a:extLst>
-          </p:cNvPr>
-          <p:cNvSpPr>
-            <a:spLocks noGrp="1"/>
-          </p:cNvSpPr>
-          <p:nvPr>
-            <p:ph type="body" sz="quarter" idx="3"/>
-          </p:nvPr>
-        </p:nvSpPr>
-        <p:spPr>
-          <a:xfrm>
-            <a:off x="6172199" y="1150069"/>
-            <a:ext cx="5683371" cy="659877"/>
-          </a:xfrm>
-          <a:prstGeom prst="rect">
-            <a:avLst/>
-          </a:prstGeom>
-          <a:solidFill>
-            <a:srgbClr val="00A1D7"/>
-          </a:solidFill>
-        </p:spPr>
-        <p:txBody>
-          <a:bodyPr vert="horz" lIns="91440" tIns="45720" rIns="91440" bIns="45720" rtlCol="0" anchor="b">
-            <a:normAutofit/>
-          </a:bodyPr>
-          <a:lstStyle>
-            <a:lvl1pPr>
-              <a:defRPr lang="en-US" b="1" dirty="0">
-                <a:solidFill>
-                  <a:schemeClr val="bg1"/>
-                </a:solidFill>
-              </a:defRPr>
-            </a:lvl1pPr>
-          </a:lstStyle>
-          <a:p>
-            <a:pPr marL="0" lvl="0" indent="0">
-              <a:buNone/>
-            </a:pPr>
-            <a:r>
-              <a:rPr lang="en-US"/>
-              <a:t>Click to edit Master text styles</a:t>
-            </a:r>
-          </a:p>
-        </p:txBody>
-      </p:sp>
-      <p:sp>
-        <p:nvSpPr>
-          <p:cNvPr id="6" name="Content Placeholder 5">
-            <a:extLst>
-              <a:ext uri="{FF2B5EF4-FFF2-40B4-BE49-F238E27FC236}">
-                <a16:creationId xmlns:a16="http://schemas.microsoft.com/office/drawing/2014/main" id="{4D14FAB4-C3D5-5802-AC62-3F1B0FEE0444}"/>
-              </a:ext>
-            </a:extLst>
-          </p:cNvPr>
-          <p:cNvSpPr>
-            <a:spLocks noGrp="1"/>
-          </p:cNvSpPr>
-          <p:nvPr>
-            <p:ph sz="quarter" idx="4"/>
-          </p:nvPr>
-        </p:nvSpPr>
-        <p:spPr>
-          <a:xfrm>
-            <a:off x="6172199" y="1809946"/>
-            <a:ext cx="5673525" cy="4619134"/>
-          </a:xfrm>
-          <a:prstGeom prst="rect">
-            <a:avLst/>
-          </a:prstGeom>
-        </p:spPr>
-        <p:txBody>
-          <a:bodyPr/>
-          <a:lstStyle/>
-          <a:p>
-            <a:pPr lvl="0"/>
-            <a:r>
-              <a:rPr lang="en-US"/>
-              <a:t>Click to edit Master text styles</a:t>
-            </a:r>
-          </a:p>
-          <a:p>
-            <a:pPr lvl="1"/>
-            <a:r>
-              <a:rPr lang="en-US"/>
-              <a:t>Second level</a:t>
-            </a:r>
-          </a:p>
-          <a:p>
-            <a:pPr lvl="2"/>
-            <a:r>
-              <a:rPr lang="en-US"/>
-              <a:t>Third level</a:t>
-            </a:r>
-          </a:p>
-          <a:p>
-            <a:pPr lvl="3"/>
-            <a:r>
-              <a:rPr lang="en-US"/>
-              <a:t>Fourth level</a:t>
-            </a:r>
-          </a:p>
-          <a:p>
-            <a:pPr lvl="4"/>
-            <a:r>
-              <a:rPr lang="en-US"/>
-              <a:t>Fifth level</a:t>
-            </a:r>
-            <a:endParaRPr lang="en-GB"/>
-          </a:p>
-        </p:txBody>
-      </p:sp>
-      <p:sp>
-        <p:nvSpPr>
-          <p:cNvPr id="11" name="Rectangle 10">
-            <a:extLst>
-              <a:ext uri="{FF2B5EF4-FFF2-40B4-BE49-F238E27FC236}">
-                <a16:creationId xmlns:a16="http://schemas.microsoft.com/office/drawing/2014/main" id="{EBB802B9-F88A-543F-655F-6F4D0B19FEA3}"/>
-              </a:ext>
-            </a:extLst>
-          </p:cNvPr>
-          <p:cNvSpPr/>
-          <p:nvPr/>
-        </p:nvSpPr>
-        <p:spPr>
-          <a:xfrm>
-            <a:off x="0" y="101176"/>
-            <a:ext cx="12191999" cy="827008"/>
-          </a:xfrm>
-          <a:prstGeom prst="rect">
-            <a:avLst/>
-          </a:prstGeom>
-          <a:solidFill>
-            <a:srgbClr val="245391"/>
-          </a:solidFill>
-          <a:ln>
-            <a:noFill/>
-          </a:ln>
-        </p:spPr>
-        <p:style>
-          <a:lnRef idx="2">
-            <a:schemeClr val="accent1">
-              <a:shade val="50000"/>
-            </a:schemeClr>
-          </a:lnRef>
-          <a:fillRef idx="1">
-            <a:schemeClr val="accent1"/>
-          </a:fillRef>
-          <a:effectRef idx="0">
-            <a:schemeClr val="accent1"/>
-          </a:effectRef>
-          <a:fontRef idx="minor">
-            <a:schemeClr val="lt1"/>
-          </a:fontRef>
-        </p:style>
-        <p:txBody>
-          <a:bodyPr rtlCol="0" anchor="ctr"/>
-          <a:lstStyle/>
-          <a:p>
-            <a:pPr algn="ctr"/>
-            <a:endParaRPr lang="en-GB"/>
-          </a:p>
-        </p:txBody>
-      </p:sp>
-      <p:sp>
-        <p:nvSpPr>
-          <p:cNvPr id="12" name="Title 1">
-            <a:extLst>
-              <a:ext uri="{FF2B5EF4-FFF2-40B4-BE49-F238E27FC236}">
-                <a16:creationId xmlns:a16="http://schemas.microsoft.com/office/drawing/2014/main" id="{661E29F3-04F3-2EEC-DB5E-CE1144A482CA}"/>
-              </a:ext>
-            </a:extLst>
-          </p:cNvPr>
-          <p:cNvSpPr>
-            <a:spLocks noGrp="1"/>
-          </p:cNvSpPr>
-          <p:nvPr>
-            <p:ph type="title"/>
-          </p:nvPr>
-        </p:nvSpPr>
-        <p:spPr>
-          <a:xfrm>
-            <a:off x="326590" y="101175"/>
-            <a:ext cx="10881880" cy="827009"/>
-          </a:xfrm>
-          <a:prstGeom prst="rect">
-            <a:avLst/>
-          </a:prstGeom>
-          <a:solidFill>
-            <a:srgbClr val="245391"/>
-          </a:solidFill>
-        </p:spPr>
-        <p:txBody>
-          <a:bodyPr>
-            <a:normAutofit/>
-          </a:bodyPr>
-          <a:lstStyle>
-            <a:lvl1pPr marL="0" indent="0">
-              <a:defRPr sz="3200" b="1">
-                <a:solidFill>
-                  <a:schemeClr val="bg1"/>
-                </a:solidFill>
-              </a:defRPr>
-            </a:lvl1pPr>
-          </a:lstStyle>
-          <a:p>
-            <a:r>
-              <a:rPr lang="en-US"/>
-              <a:t>Click to edit Master title style</a:t>
-            </a:r>
-            <a:endParaRPr lang="en-GB" dirty="0"/>
-          </a:p>
-        </p:txBody>
-      </p:sp>
-      <p:sp>
-        <p:nvSpPr>
-          <p:cNvPr id="13" name="Slide Number Placeholder 5">
-            <a:extLst>
-              <a:ext uri="{FF2B5EF4-FFF2-40B4-BE49-F238E27FC236}">
-                <a16:creationId xmlns:a16="http://schemas.microsoft.com/office/drawing/2014/main" id="{B0D63A05-1B5F-F916-3C25-1C57B251A0A9}"/>
-              </a:ext>
-            </a:extLst>
-          </p:cNvPr>
-          <p:cNvSpPr>
-            <a:spLocks noGrp="1"/>
-          </p:cNvSpPr>
-          <p:nvPr>
-            <p:ph type="sldNum" sz="quarter" idx="10"/>
-          </p:nvPr>
-        </p:nvSpPr>
-        <p:spPr>
-          <a:xfrm>
-            <a:off x="11484634" y="6650966"/>
-            <a:ext cx="370936" cy="207034"/>
-          </a:xfrm>
-          <a:prstGeom prst="rect">
-            <a:avLst/>
-          </a:prstGeom>
-        </p:spPr>
-        <p:txBody>
-          <a:bodyPr/>
-          <a:lstStyle>
-            <a:lvl1pPr algn="r">
-              <a:defRPr sz="1000">
-                <a:solidFill>
-                  <a:schemeClr val="bg1"/>
-                </a:solidFill>
-              </a:defRPr>
-            </a:lvl1pPr>
-          </a:lstStyle>
-          <a:p>
-            <a:fld id="{7767393B-85A6-40C1-AB65-A74DA355DB56}" type="slidenum">
-              <a:rPr lang="en-GB" smtClean="0"/>
-              <a:pPr/>
-              <a:t>‹#›</a:t>
-            </a:fld>
-            <a:endParaRPr lang="en-GB"/>
-          </a:p>
-        </p:txBody>
-      </p:sp>
-      <p:sp>
-        <p:nvSpPr>
-          <p:cNvPr id="10" name="Parallelogram 9">
-            <a:extLst>
-              <a:ext uri="{FF2B5EF4-FFF2-40B4-BE49-F238E27FC236}">
-                <a16:creationId xmlns:a16="http://schemas.microsoft.com/office/drawing/2014/main" id="{A8BEBF3B-172E-2413-9A25-866F82E4CB89}"/>
-              </a:ext>
-            </a:extLst>
-          </p:cNvPr>
-          <p:cNvSpPr/>
-          <p:nvPr/>
-        </p:nvSpPr>
-        <p:spPr>
-          <a:xfrm>
-            <a:off x="11208471" y="159685"/>
-            <a:ext cx="848382" cy="709988"/>
-          </a:xfrm>
-          <a:prstGeom prst="parallelogram">
-            <a:avLst/>
-          </a:prstGeom>
-          <a:solidFill>
-            <a:srgbClr val="F4DB52"/>
-          </a:solidFill>
-          <a:ln>
-            <a:noFill/>
-          </a:ln>
-        </p:spPr>
-        <p:style>
-          <a:lnRef idx="2">
-            <a:schemeClr val="accent1">
-              <a:shade val="50000"/>
-            </a:schemeClr>
-          </a:lnRef>
-          <a:fillRef idx="1">
-            <a:schemeClr val="accent1"/>
-          </a:fillRef>
-          <a:effectRef idx="0">
-            <a:schemeClr val="accent1"/>
-          </a:effectRef>
-          <a:fontRef idx="minor">
-            <a:schemeClr val="lt1"/>
-          </a:fontRef>
-        </p:style>
-        <p:txBody>
-          <a:bodyPr rtlCol="0" anchor="ctr"/>
-          <a:lstStyle/>
-          <a:p>
-            <a:pPr algn="ctr"/>
-            <a:endParaRPr lang="en-GB"/>
-          </a:p>
-        </p:txBody>
-      </p:sp>
-      <p:pic>
-        <p:nvPicPr>
-          <p:cNvPr id="14" name="Graphic 13">
-            <a:extLst>
-              <a:ext uri="{FF2B5EF4-FFF2-40B4-BE49-F238E27FC236}">
-                <a16:creationId xmlns:a16="http://schemas.microsoft.com/office/drawing/2014/main" id="{B21F8D27-112C-1D59-B934-D55D42264835}"/>
-              </a:ext>
-            </a:extLst>
-          </p:cNvPr>
-          <p:cNvPicPr>
-            <a:picLocks noChangeAspect="1"/>
-          </p:cNvPicPr>
-          <p:nvPr/>
-        </p:nvPicPr>
-        <p:blipFill>
-          <a:blip r:embed="rId2">
-            <a:extLst>
-              <a:ext uri="{28A0092B-C50C-407E-A947-70E740481C1C}">
-                <a14:useLocalDpi xmlns:a14="http://schemas.microsoft.com/office/drawing/2010/main" val="0"/>
-              </a:ext>
-              <a:ext uri="{96DAC541-7B7A-43D3-8B79-37D633B846F1}">
-                <asvg:svgBlip xmlns:asvg="http://schemas.microsoft.com/office/drawing/2016/SVG/main" r:embed="rId3"/>
-              </a:ext>
-            </a:extLst>
-          </a:blip>
-          <a:stretch>
-            <a:fillRect/>
-          </a:stretch>
-        </p:blipFill>
-        <p:spPr>
-          <a:xfrm>
-            <a:off x="11419250" y="203307"/>
-            <a:ext cx="426823" cy="622742"/>
-          </a:xfrm>
-          <a:prstGeom prst="rect">
-            <a:avLst/>
-          </a:prstGeom>
-        </p:spPr>
-      </p:pic>
-    </p:spTree>
-    <p:extLst>
-      <p:ext uri="{BB962C8B-B14F-4D97-AF65-F5344CB8AC3E}">
-        <p14:creationId xmlns:p14="http://schemas.microsoft.com/office/powerpoint/2010/main" val="49639326"/>
+        <p14:creationId xmlns:p14="http://schemas.microsoft.com/office/powerpoint/2010/main" val="315990423"/>
       </p:ext>
     </p:extLst>
   </p:cSld>
@@ -6769,16 +4432,12 @@
     <p:sldLayoutId id="2147483664" r:id="rId4"/>
     <p:sldLayoutId id="2147483665" r:id="rId5"/>
     <p:sldLayoutId id="2147483666" r:id="rId6"/>
-    <p:sldLayoutId id="2147483667" r:id="rId7"/>
-    <p:sldLayoutId id="2147483668" r:id="rId8"/>
-    <p:sldLayoutId id="2147483669" r:id="rId9"/>
-    <p:sldLayoutId id="2147483670" r:id="rId10"/>
-    <p:sldLayoutId id="2147483671" r:id="rId11"/>
-    <p:sldLayoutId id="2147483672" r:id="rId12"/>
-    <p:sldLayoutId id="2147483673" r:id="rId13"/>
-    <p:sldLayoutId id="2147483674" r:id="rId14"/>
-    <p:sldLayoutId id="2147483675" r:id="rId15"/>
-    <p:sldLayoutId id="2147483676" r:id="rId16"/>
+    <p:sldLayoutId id="2147483669" r:id="rId7"/>
+    <p:sldLayoutId id="2147483672" r:id="rId8"/>
+    <p:sldLayoutId id="2147483673" r:id="rId9"/>
+    <p:sldLayoutId id="2147483674" r:id="rId10"/>
+    <p:sldLayoutId id="2147483675" r:id="rId11"/>
+    <p:sldLayoutId id="2147483676" r:id="rId12"/>
   </p:sldLayoutIdLst>
   <p:txStyles>
     <p:titleStyle>
@@ -7148,7 +4807,11 @@
                   <a:schemeClr val="bg1"/>
                 </a:solidFill>
               </a:rPr>
-              <a:t>School of Architecture, Planning &amp; Environmental Policy</a:t>
+              <a:t>School of </a:t>
+            </a:r>
+            <a:r>
+              <a:rPr lang="en-IE" sz="2800" dirty="0"/>
+              <a:t>Architecture, Planning &amp; Environmental Policy</a:t>
             </a:r>
             <a:endParaRPr lang="en-GB" sz="3200" dirty="0"/>
           </a:p>
@@ -7428,7 +5091,7 @@
           <a:lstStyle/>
           <a:p>
             <a:r>
-              <a:rPr lang="en-IE" dirty="0"/>
+              <a:rPr lang="en-US" dirty="0"/>
               <a:t>School of Architecture, Planning &amp; Environmental Policy</a:t>
             </a:r>
             <a:endParaRPr lang="en-GB" dirty="0"/>
@@ -7703,8 +5366,8 @@
         </p:nvSpPr>
         <p:spPr>
           <a:xfrm>
-            <a:off x="151105" y="2882900"/>
-            <a:ext cx="11889789" cy="2387600"/>
+            <a:off x="149811" y="3429000"/>
+            <a:ext cx="11892378" cy="2387600"/>
           </a:xfrm>
           <a:noFill/>
         </p:spPr>
@@ -7738,7 +5401,7 @@
               </a:rPr>
             </a:br>
             <a:r>
-              <a:rPr lang="en-IE" sz="1800" dirty="0">
+              <a:rPr lang="en-US" sz="1800">
                 <a:solidFill>
                   <a:schemeClr val="bg1"/>
                 </a:solidFill>

</xml_diff>